<commit_message>
passed scaled value to fit
</commit_message>
<xml_diff>
--- a/5 - Multiple Linear Regression/Normal Equation.pptx
+++ b/5 - Multiple Linear Regression/Normal Equation.pptx
@@ -9,15 +9,15 @@
   </p:notesMasterIdLst>
   <p:sldIdLst>
     <p:sldId id="257" r:id="rId5"/>
-    <p:sldId id="291" r:id="rId6"/>
-    <p:sldId id="408" r:id="rId7"/>
-    <p:sldId id="426" r:id="rId8"/>
-    <p:sldId id="414" r:id="rId9"/>
-    <p:sldId id="418" r:id="rId10"/>
-    <p:sldId id="427" r:id="rId11"/>
-    <p:sldId id="429" r:id="rId12"/>
-    <p:sldId id="431" r:id="rId13"/>
-    <p:sldId id="432" r:id="rId14"/>
+    <p:sldId id="408" r:id="rId6"/>
+    <p:sldId id="426" r:id="rId7"/>
+    <p:sldId id="414" r:id="rId8"/>
+    <p:sldId id="418" r:id="rId9"/>
+    <p:sldId id="427" r:id="rId10"/>
+    <p:sldId id="429" r:id="rId11"/>
+    <p:sldId id="431" r:id="rId12"/>
+    <p:sldId id="432" r:id="rId13"/>
+    <p:sldId id="433" r:id="rId14"/>
   </p:sldIdLst>
   <p:sldSz cx="12192000" cy="6858000"/>
   <p:notesSz cx="6858000" cy="9144000"/>
@@ -214,7 +214,7 @@
           <a:p>
             <a:fld id="{F666E1FD-E7A0-497B-BBC0-740BAAC97C64}" type="datetimeFigureOut">
               <a:rPr lang="en-PH" smtClean="0"/>
-              <a:t>21/09/2023</a:t>
+              <a:t>9/21/23</a:t>
             </a:fld>
             <a:endParaRPr lang="en-PH"/>
           </a:p>
@@ -640,7 +640,7 @@
     </p:spTree>
     <p:extLst>
       <p:ext uri="{BB962C8B-B14F-4D97-AF65-F5344CB8AC3E}">
-        <p14:creationId xmlns:p14="http://schemas.microsoft.com/office/powerpoint/2010/main" val="2699932226"/>
+        <p14:creationId xmlns:p14="http://schemas.microsoft.com/office/powerpoint/2010/main" val="2720466506"/>
       </p:ext>
     </p:extLst>
   </p:cSld>
@@ -724,7 +724,7 @@
     </p:spTree>
     <p:extLst>
       <p:ext uri="{BB962C8B-B14F-4D97-AF65-F5344CB8AC3E}">
-        <p14:creationId xmlns:p14="http://schemas.microsoft.com/office/powerpoint/2010/main" val="1265636569"/>
+        <p14:creationId xmlns:p14="http://schemas.microsoft.com/office/powerpoint/2010/main" val="1445561023"/>
       </p:ext>
     </p:extLst>
   </p:cSld>
@@ -808,7 +808,7 @@
     </p:spTree>
     <p:extLst>
       <p:ext uri="{BB962C8B-B14F-4D97-AF65-F5344CB8AC3E}">
-        <p14:creationId xmlns:p14="http://schemas.microsoft.com/office/powerpoint/2010/main" val="1445561023"/>
+        <p14:creationId xmlns:p14="http://schemas.microsoft.com/office/powerpoint/2010/main" val="225286487"/>
       </p:ext>
     </p:extLst>
   </p:cSld>
@@ -892,7 +892,7 @@
     </p:spTree>
     <p:extLst>
       <p:ext uri="{BB962C8B-B14F-4D97-AF65-F5344CB8AC3E}">
-        <p14:creationId xmlns:p14="http://schemas.microsoft.com/office/powerpoint/2010/main" val="225286487"/>
+        <p14:creationId xmlns:p14="http://schemas.microsoft.com/office/powerpoint/2010/main" val="4044210789"/>
       </p:ext>
     </p:extLst>
   </p:cSld>
@@ -976,7 +976,7 @@
     </p:spTree>
     <p:extLst>
       <p:ext uri="{BB962C8B-B14F-4D97-AF65-F5344CB8AC3E}">
-        <p14:creationId xmlns:p14="http://schemas.microsoft.com/office/powerpoint/2010/main" val="4044210789"/>
+        <p14:creationId xmlns:p14="http://schemas.microsoft.com/office/powerpoint/2010/main" val="3969971084"/>
       </p:ext>
     </p:extLst>
   </p:cSld>
@@ -1060,7 +1060,7 @@
     </p:spTree>
     <p:extLst>
       <p:ext uri="{BB962C8B-B14F-4D97-AF65-F5344CB8AC3E}">
-        <p14:creationId xmlns:p14="http://schemas.microsoft.com/office/powerpoint/2010/main" val="3969971084"/>
+        <p14:creationId xmlns:p14="http://schemas.microsoft.com/office/powerpoint/2010/main" val="2944468065"/>
       </p:ext>
     </p:extLst>
   </p:cSld>
@@ -1144,7 +1144,7 @@
     </p:spTree>
     <p:extLst>
       <p:ext uri="{BB962C8B-B14F-4D97-AF65-F5344CB8AC3E}">
-        <p14:creationId xmlns:p14="http://schemas.microsoft.com/office/powerpoint/2010/main" val="2944468065"/>
+        <p14:creationId xmlns:p14="http://schemas.microsoft.com/office/powerpoint/2010/main" val="3848898515"/>
       </p:ext>
     </p:extLst>
   </p:cSld>
@@ -1228,7 +1228,7 @@
     </p:spTree>
     <p:extLst>
       <p:ext uri="{BB962C8B-B14F-4D97-AF65-F5344CB8AC3E}">
-        <p14:creationId xmlns:p14="http://schemas.microsoft.com/office/powerpoint/2010/main" val="3848898515"/>
+        <p14:creationId xmlns:p14="http://schemas.microsoft.com/office/powerpoint/2010/main" val="444682497"/>
       </p:ext>
     </p:extLst>
   </p:cSld>
@@ -1312,7 +1312,7 @@
     </p:spTree>
     <p:extLst>
       <p:ext uri="{BB962C8B-B14F-4D97-AF65-F5344CB8AC3E}">
-        <p14:creationId xmlns:p14="http://schemas.microsoft.com/office/powerpoint/2010/main" val="444682497"/>
+        <p14:creationId xmlns:p14="http://schemas.microsoft.com/office/powerpoint/2010/main" val="2699932226"/>
       </p:ext>
     </p:extLst>
   </p:cSld>
@@ -1471,7 +1471,7 @@
           <a:p>
             <a:fld id="{0CCF0B81-6BD8-4C65-9459-815598C5F1F4}" type="datetimeFigureOut">
               <a:rPr lang="en-PH" smtClean="0"/>
-              <a:t>21/09/2023</a:t>
+              <a:t>9/21/23</a:t>
             </a:fld>
             <a:endParaRPr lang="en-PH"/>
           </a:p>
@@ -1671,7 +1671,7 @@
           <a:p>
             <a:fld id="{0CCF0B81-6BD8-4C65-9459-815598C5F1F4}" type="datetimeFigureOut">
               <a:rPr lang="en-PH" smtClean="0"/>
-              <a:t>21/09/2023</a:t>
+              <a:t>9/21/23</a:t>
             </a:fld>
             <a:endParaRPr lang="en-PH"/>
           </a:p>
@@ -1881,7 +1881,7 @@
           <a:p>
             <a:fld id="{0CCF0B81-6BD8-4C65-9459-815598C5F1F4}" type="datetimeFigureOut">
               <a:rPr lang="en-PH" smtClean="0"/>
-              <a:t>21/09/2023</a:t>
+              <a:t>9/21/23</a:t>
             </a:fld>
             <a:endParaRPr lang="en-PH"/>
           </a:p>
@@ -2081,7 +2081,7 @@
           <a:p>
             <a:fld id="{0CCF0B81-6BD8-4C65-9459-815598C5F1F4}" type="datetimeFigureOut">
               <a:rPr lang="en-PH" smtClean="0"/>
-              <a:t>21/09/2023</a:t>
+              <a:t>9/21/23</a:t>
             </a:fld>
             <a:endParaRPr lang="en-PH"/>
           </a:p>
@@ -2357,7 +2357,7 @@
           <a:p>
             <a:fld id="{0CCF0B81-6BD8-4C65-9459-815598C5F1F4}" type="datetimeFigureOut">
               <a:rPr lang="en-PH" smtClean="0"/>
-              <a:t>21/09/2023</a:t>
+              <a:t>9/21/23</a:t>
             </a:fld>
             <a:endParaRPr lang="en-PH"/>
           </a:p>
@@ -2625,7 +2625,7 @@
           <a:p>
             <a:fld id="{0CCF0B81-6BD8-4C65-9459-815598C5F1F4}" type="datetimeFigureOut">
               <a:rPr lang="en-PH" smtClean="0"/>
-              <a:t>21/09/2023</a:t>
+              <a:t>9/21/23</a:t>
             </a:fld>
             <a:endParaRPr lang="en-PH"/>
           </a:p>
@@ -3040,7 +3040,7 @@
           <a:p>
             <a:fld id="{0CCF0B81-6BD8-4C65-9459-815598C5F1F4}" type="datetimeFigureOut">
               <a:rPr lang="en-PH" smtClean="0"/>
-              <a:t>21/09/2023</a:t>
+              <a:t>9/21/23</a:t>
             </a:fld>
             <a:endParaRPr lang="en-PH"/>
           </a:p>
@@ -3182,7 +3182,7 @@
           <a:p>
             <a:fld id="{0CCF0B81-6BD8-4C65-9459-815598C5F1F4}" type="datetimeFigureOut">
               <a:rPr lang="en-PH" smtClean="0"/>
-              <a:t>21/09/2023</a:t>
+              <a:t>9/21/23</a:t>
             </a:fld>
             <a:endParaRPr lang="en-PH"/>
           </a:p>
@@ -3295,7 +3295,7 @@
           <a:p>
             <a:fld id="{0CCF0B81-6BD8-4C65-9459-815598C5F1F4}" type="datetimeFigureOut">
               <a:rPr lang="en-PH" smtClean="0"/>
-              <a:t>21/09/2023</a:t>
+              <a:t>9/21/23</a:t>
             </a:fld>
             <a:endParaRPr lang="en-PH"/>
           </a:p>
@@ -3608,7 +3608,7 @@
           <a:p>
             <a:fld id="{0CCF0B81-6BD8-4C65-9459-815598C5F1F4}" type="datetimeFigureOut">
               <a:rPr lang="en-PH" smtClean="0"/>
-              <a:t>21/09/2023</a:t>
+              <a:t>9/21/23</a:t>
             </a:fld>
             <a:endParaRPr lang="en-PH"/>
           </a:p>
@@ -3897,7 +3897,7 @@
           <a:p>
             <a:fld id="{0CCF0B81-6BD8-4C65-9459-815598C5F1F4}" type="datetimeFigureOut">
               <a:rPr lang="en-PH" smtClean="0"/>
-              <a:t>21/09/2023</a:t>
+              <a:t>9/21/23</a:t>
             </a:fld>
             <a:endParaRPr lang="en-PH"/>
           </a:p>
@@ -4140,7 +4140,7 @@
           <a:p>
             <a:fld id="{0CCF0B81-6BD8-4C65-9459-815598C5F1F4}" type="datetimeFigureOut">
               <a:rPr lang="en-PH" smtClean="0"/>
-              <a:t>21/09/2023</a:t>
+              <a:t>9/21/23</a:t>
             </a:fld>
             <a:endParaRPr lang="en-PH"/>
           </a:p>
@@ -4839,6 +4839,7 @@
               </a:bodyPr>
               <a:lstStyle/>
               <a:p>
+                <a:pPr/>
                 <a14:m>
                   <m:oMathPara xmlns:m="http://schemas.openxmlformats.org/officeDocument/2006/math">
                     <m:oMathParaPr>
@@ -4923,7 +4924,7 @@
               <a:blipFill>
                 <a:blip r:embed="rId4"/>
                 <a:stretch>
-                  <a:fillRect t="-23656"/>
+                  <a:fillRect t="-82609" b="-52174"/>
                 </a:stretch>
               </a:blipFill>
             </p:spPr>
@@ -4932,7 +4933,7 @@
               <a:lstStyle/>
               <a:p>
                 <a:r>
-                  <a:rPr lang="en-PH">
+                  <a:rPr lang="en-US">
                     <a:noFill/>
                   </a:rPr>
                   <a:t> </a:t>
@@ -4959,7 +4960,7 @@
             <p:spPr>
               <a:xfrm>
                 <a:off x="3872921" y="1537368"/>
-                <a:ext cx="4446157" cy="1038682"/>
+                <a:ext cx="5443201" cy="1146724"/>
               </a:xfrm>
               <a:prstGeom prst="rect">
                 <a:avLst/>
@@ -4978,57 +4979,6 @@
                       <m:dPr>
                         <m:ctrlPr>
                           <a:rPr lang="en-PH" sz="4000" i="1" smtClean="0">
-                            <a:latin typeface="Cambria Math" panose="02040503050406030204" pitchFamily="18" charset="0"/>
-                            <a:ea typeface="Cambria Math" panose="02040503050406030204" pitchFamily="18" charset="0"/>
-                          </a:rPr>
-                        </m:ctrlPr>
-                      </m:dPr>
-                      <m:e>
-                        <m:eqArr>
-                          <m:eqArrPr>
-                            <m:ctrlPr>
-                              <a:rPr lang="en-US" sz="4000" b="0" i="1" smtClean="0">
-                                <a:latin typeface="Cambria Math" panose="02040503050406030204" pitchFamily="18" charset="0"/>
-                                <a:ea typeface="Cambria Math" panose="02040503050406030204" pitchFamily="18" charset="0"/>
-                              </a:rPr>
-                            </m:ctrlPr>
-                          </m:eqArrPr>
-                          <m:e>
-                            <m:r>
-                              <a:rPr lang="en-US" sz="4000" b="0" i="1" smtClean="0">
-                                <a:latin typeface="Cambria Math" panose="02040503050406030204" pitchFamily="18" charset="0"/>
-                                <a:ea typeface="Cambria Math" panose="02040503050406030204" pitchFamily="18" charset="0"/>
-                              </a:rPr>
-                              <m:t>3    6</m:t>
-                            </m:r>
-                          </m:e>
-                          <m:e>
-                            <m:r>
-                              <a:rPr lang="en-US" sz="4000" b="0" i="1" smtClean="0">
-                                <a:latin typeface="Cambria Math" panose="02040503050406030204" pitchFamily="18" charset="0"/>
-                                <a:ea typeface="Cambria Math" panose="02040503050406030204" pitchFamily="18" charset="0"/>
-                              </a:rPr>
-                              <m:t>6  14</m:t>
-                            </m:r>
-                          </m:e>
-                        </m:eqArr>
-                      </m:e>
-                    </m:d>
-                  </m:oMath>
-                </a14:m>
-                <a:r>
-                  <a:rPr lang="en-PH" sz="4000" dirty="0">
-                    <a:latin typeface="Cambria Math" panose="02040503050406030204" pitchFamily="18" charset="0"/>
-                    <a:ea typeface="Cambria Math" panose="02040503050406030204" pitchFamily="18" charset="0"/>
-                  </a:rPr>
-                  <a:t> </a:t>
-                </a:r>
-                <a14:m>
-                  <m:oMath xmlns:m="http://schemas.openxmlformats.org/officeDocument/2006/math">
-                    <m:d>
-                      <m:dPr>
-                        <m:ctrlPr>
-                          <a:rPr lang="en-PH" sz="4000" i="1">
                             <a:latin typeface="Cambria Math" panose="02040503050406030204" pitchFamily="18" charset="0"/>
                             <a:ea typeface="Cambria Math" panose="02040503050406030204" pitchFamily="18" charset="0"/>
                           </a:rPr>
@@ -5076,6 +5026,67 @@
                 </a:r>
                 <a14:m>
                   <m:oMath xmlns:m="http://schemas.openxmlformats.org/officeDocument/2006/math">
+                    <m:sSup>
+                      <m:sSupPr>
+                        <m:ctrlPr>
+                          <a:rPr lang="en-PH" sz="4000" i="1" dirty="0" smtClean="0">
+                            <a:latin typeface="Cambria Math" panose="02040503050406030204" pitchFamily="18" charset="0"/>
+                            <a:ea typeface="Cambria Math" panose="02040503050406030204" pitchFamily="18" charset="0"/>
+                          </a:rPr>
+                        </m:ctrlPr>
+                      </m:sSupPr>
+                      <m:e>
+                        <m:d>
+                          <m:dPr>
+                            <m:ctrlPr>
+                              <a:rPr lang="en-PH" sz="4000" i="1">
+                                <a:latin typeface="Cambria Math" panose="02040503050406030204" pitchFamily="18" charset="0"/>
+                                <a:ea typeface="Cambria Math" panose="02040503050406030204" pitchFamily="18" charset="0"/>
+                              </a:rPr>
+                            </m:ctrlPr>
+                          </m:dPr>
+                          <m:e>
+                            <m:eqArr>
+                              <m:eqArrPr>
+                                <m:ctrlPr>
+                                  <a:rPr lang="en-US" sz="4000" i="1">
+                                    <a:latin typeface="Cambria Math" panose="02040503050406030204" pitchFamily="18" charset="0"/>
+                                    <a:ea typeface="Cambria Math" panose="02040503050406030204" pitchFamily="18" charset="0"/>
+                                  </a:rPr>
+                                </m:ctrlPr>
+                              </m:eqArrPr>
+                              <m:e>
+                                <m:r>
+                                  <a:rPr lang="en-US" sz="4000" i="1">
+                                    <a:latin typeface="Cambria Math" panose="02040503050406030204" pitchFamily="18" charset="0"/>
+                                    <a:ea typeface="Cambria Math" panose="02040503050406030204" pitchFamily="18" charset="0"/>
+                                  </a:rPr>
+                                  <m:t>3    6</m:t>
+                                </m:r>
+                              </m:e>
+                              <m:e>
+                                <m:r>
+                                  <a:rPr lang="en-US" sz="4000" i="1">
+                                    <a:latin typeface="Cambria Math" panose="02040503050406030204" pitchFamily="18" charset="0"/>
+                                    <a:ea typeface="Cambria Math" panose="02040503050406030204" pitchFamily="18" charset="0"/>
+                                  </a:rPr>
+                                  <m:t>6  14</m:t>
+                                </m:r>
+                              </m:e>
+                            </m:eqArr>
+                          </m:e>
+                        </m:d>
+                      </m:e>
+                      <m:sup>
+                        <m:r>
+                          <a:rPr lang="en-US" sz="4000" b="0" i="1" dirty="0" smtClean="0">
+                            <a:latin typeface="Cambria Math" panose="02040503050406030204" pitchFamily="18" charset="0"/>
+                            <a:ea typeface="Cambria Math" panose="02040503050406030204" pitchFamily="18" charset="0"/>
+                          </a:rPr>
+                          <m:t>−1</m:t>
+                        </m:r>
+                      </m:sup>
+                    </m:sSup>
                     <m:d>
                       <m:dPr>
                         <m:ctrlPr>
@@ -5147,7 +5158,7 @@
             <p:spPr>
               <a:xfrm>
                 <a:off x="3872921" y="1537368"/>
-                <a:ext cx="4446157" cy="1038682"/>
+                <a:ext cx="5443201" cy="1146724"/>
               </a:xfrm>
               <a:prstGeom prst="rect">
                 <a:avLst/>
@@ -5155,7 +5166,7 @@
               <a:blipFill>
                 <a:blip r:embed="rId5"/>
                 <a:stretch>
-                  <a:fillRect b="-7602"/>
+                  <a:fillRect b="-29348"/>
                 </a:stretch>
               </a:blipFill>
             </p:spPr>
@@ -5164,7 +5175,7 @@
               <a:lstStyle/>
               <a:p>
                 <a:r>
-                  <a:rPr lang="en-PH">
+                  <a:rPr lang="en-US">
                     <a:noFill/>
                   </a:rPr>
                   <a:t> </a:t>
@@ -5191,7 +5202,7 @@
             <p:spPr>
               <a:xfrm>
                 <a:off x="4017866" y="3208795"/>
-                <a:ext cx="4156266" cy="769441"/>
+                <a:ext cx="4203009" cy="769441"/>
               </a:xfrm>
               <a:prstGeom prst="rect">
                 <a:avLst/>
@@ -5204,6 +5215,7 @@
               </a:bodyPr>
               <a:lstStyle/>
               <a:p>
+                <a:pPr/>
                 <a14:m>
                   <m:oMathPara xmlns:m="http://schemas.openxmlformats.org/officeDocument/2006/math">
                     <m:oMathParaPr>
@@ -5212,6 +5224,9 @@
                     <m:oMath xmlns:m="http://schemas.openxmlformats.org/officeDocument/2006/math">
                       <m:r>
                         <a:rPr lang="en-US" sz="5000" b="0" i="1" smtClean="0">
+                          <a:solidFill>
+                            <a:srgbClr val="FFC000"/>
+                          </a:solidFill>
                           <a:latin typeface="Cambria Math" panose="02040503050406030204" pitchFamily="18" charset="0"/>
                         </a:rPr>
                         <m:t>𝑏</m:t>
@@ -5223,10 +5238,13 @@
                         <m:t>=1, </m:t>
                       </m:r>
                       <m:r>
-                        <a:rPr lang="en-US" sz="5000" b="0" i="1" smtClean="0">
+                        <a:rPr lang="en-US" sz="5000" b="1" i="1" smtClean="0">
+                          <a:solidFill>
+                            <a:srgbClr val="00B0F0"/>
+                          </a:solidFill>
                           <a:latin typeface="Cambria Math" panose="02040503050406030204" pitchFamily="18" charset="0"/>
                         </a:rPr>
-                        <m:t>𝑚</m:t>
+                        <m:t>𝒎</m:t>
                       </m:r>
                       <m:r>
                         <a:rPr lang="en-US" sz="5000" b="0" i="1" smtClean="0">
@@ -5260,7 +5278,7 @@
             <p:spPr>
               <a:xfrm>
                 <a:off x="4017866" y="3208795"/>
-                <a:ext cx="4156266" cy="769441"/>
+                <a:ext cx="4203009" cy="769441"/>
               </a:xfrm>
               <a:prstGeom prst="rect">
                 <a:avLst/>
@@ -5268,7 +5286,7 @@
               <a:blipFill>
                 <a:blip r:embed="rId6"/>
                 <a:stretch>
-                  <a:fillRect/>
+                  <a:fillRect l="-3313" r="-3012" b="-6452"/>
                 </a:stretch>
               </a:blipFill>
             </p:spPr>
@@ -5277,7 +5295,7 @@
               <a:lstStyle/>
               <a:p>
                 <a:r>
-                  <a:rPr lang="en-PH">
+                  <a:rPr lang="en-US">
                     <a:noFill/>
                   </a:rPr>
                   <a:t> </a:t>
@@ -5304,7 +5322,7 @@
             <p:spPr>
               <a:xfrm>
                 <a:off x="4275565" y="4325247"/>
-                <a:ext cx="3640868" cy="1440459"/>
+                <a:ext cx="3726468" cy="1440459"/>
               </a:xfrm>
               <a:prstGeom prst="rect">
                 <a:avLst/>
@@ -5317,6 +5335,7 @@
               </a:bodyPr>
               <a:lstStyle/>
               <a:p>
+                <a:pPr/>
                 <a14:m>
                   <m:oMathPara xmlns:m="http://schemas.openxmlformats.org/officeDocument/2006/math">
                     <m:oMathParaPr>
@@ -5324,58 +5343,85 @@
                     </m:oMathParaPr>
                     <m:oMath xmlns:m="http://schemas.openxmlformats.org/officeDocument/2006/math">
                       <m:r>
-                        <a:rPr lang="en-US" sz="5000" b="0" i="1" smtClean="0">
+                        <a:rPr lang="en-US" sz="5000" b="1" i="1" smtClean="0">
+                          <a:solidFill>
+                            <a:srgbClr val="00B050"/>
+                          </a:solidFill>
                           <a:latin typeface="Cambria Math" panose="02040503050406030204" pitchFamily="18" charset="0"/>
                         </a:rPr>
-                        <m:t>𝑦</m:t>
+                        <m:t>𝒚</m:t>
                       </m:r>
                       <m:r>
-                        <a:rPr lang="en-US" sz="5000" b="0" i="1" smtClean="0">
+                        <a:rPr lang="en-US" sz="5000" b="1" i="1" smtClean="0">
                           <a:latin typeface="Cambria Math" panose="02040503050406030204" pitchFamily="18" charset="0"/>
                         </a:rPr>
-                        <m:t>=1+ </m:t>
+                        <m:t>=</m:t>
+                      </m:r>
+                      <m:r>
+                        <a:rPr lang="en-US" sz="5000" b="1" i="1" smtClean="0">
+                          <a:solidFill>
+                            <a:srgbClr val="FFC000"/>
+                          </a:solidFill>
+                          <a:latin typeface="Cambria Math" panose="02040503050406030204" pitchFamily="18" charset="0"/>
+                        </a:rPr>
+                        <m:t>𝟏</m:t>
+                      </m:r>
+                      <m:r>
+                        <a:rPr lang="en-US" sz="5000" b="1" i="1" smtClean="0">
+                          <a:latin typeface="Cambria Math" panose="02040503050406030204" pitchFamily="18" charset="0"/>
+                        </a:rPr>
+                        <m:t>+ </m:t>
                       </m:r>
                       <m:f>
                         <m:fPr>
                           <m:ctrlPr>
-                            <a:rPr lang="en-US" sz="5000" b="0" i="1" smtClean="0">
+                            <a:rPr lang="en-US" sz="5000" b="1" i="1" smtClean="0">
+                              <a:solidFill>
+                                <a:srgbClr val="00B0F0"/>
+                              </a:solidFill>
                               <a:latin typeface="Cambria Math" panose="02040503050406030204" pitchFamily="18" charset="0"/>
                             </a:rPr>
                           </m:ctrlPr>
                         </m:fPr>
                         <m:num>
                           <m:r>
-                            <a:rPr lang="en-US" sz="5000" b="0" i="1" smtClean="0">
+                            <a:rPr lang="en-US" sz="5000" b="1" i="1" smtClean="0">
+                              <a:solidFill>
+                                <a:srgbClr val="00B0F0"/>
+                              </a:solidFill>
                               <a:latin typeface="Cambria Math" panose="02040503050406030204" pitchFamily="18" charset="0"/>
                             </a:rPr>
-                            <m:t>1</m:t>
+                            <m:t>𝟏</m:t>
                           </m:r>
                         </m:num>
                         <m:den>
                           <m:r>
-                            <a:rPr lang="en-US" sz="5000" b="0" i="1" smtClean="0">
+                            <a:rPr lang="en-US" sz="5000" b="1" i="1" smtClean="0">
+                              <a:solidFill>
+                                <a:srgbClr val="00B0F0"/>
+                              </a:solidFill>
                               <a:latin typeface="Cambria Math" panose="02040503050406030204" pitchFamily="18" charset="0"/>
                             </a:rPr>
-                            <m:t>2</m:t>
+                            <m:t>𝟐</m:t>
                           </m:r>
                         </m:den>
                       </m:f>
                       <m:r>
-                        <a:rPr lang="en-US" sz="5000" b="0" i="1" smtClean="0">
+                        <a:rPr lang="en-US" sz="5000" b="1" i="1" smtClean="0">
                           <a:latin typeface="Cambria Math" panose="02040503050406030204" pitchFamily="18" charset="0"/>
                         </a:rPr>
                         <m:t> </m:t>
                       </m:r>
                       <m:r>
-                        <a:rPr lang="en-US" sz="5000" b="0" i="1" smtClean="0">
+                        <a:rPr lang="en-US" sz="5000" b="1" i="1" smtClean="0">
                           <a:latin typeface="Cambria Math" panose="02040503050406030204" pitchFamily="18" charset="0"/>
                         </a:rPr>
-                        <m:t>𝑋</m:t>
+                        <m:t>𝑿</m:t>
                       </m:r>
                     </m:oMath>
                   </m:oMathPara>
                 </a14:m>
-                <a:endParaRPr lang="en-PH" sz="5000" dirty="0"/>
+                <a:endParaRPr lang="en-PH" sz="5000" b="1" dirty="0"/>
               </a:p>
             </p:txBody>
           </p:sp>
@@ -5398,7 +5444,7 @@
             <p:spPr>
               <a:xfrm>
                 <a:off x="4275565" y="4325247"/>
-                <a:ext cx="3640868" cy="1440459"/>
+                <a:ext cx="3726468" cy="1440459"/>
               </a:xfrm>
               <a:prstGeom prst="rect">
                 <a:avLst/>
@@ -5406,7 +5452,7 @@
               <a:blipFill>
                 <a:blip r:embed="rId7"/>
                 <a:stretch>
-                  <a:fillRect/>
+                  <a:fillRect l="-3729" t="-1739" r="-3051" b="-13913"/>
                 </a:stretch>
               </a:blipFill>
             </p:spPr>
@@ -5415,7 +5461,7 @@
               <a:lstStyle/>
               <a:p>
                 <a:r>
-                  <a:rPr lang="en-PH">
+                  <a:rPr lang="en-US">
                     <a:noFill/>
                   </a:rPr>
                   <a:t> </a:t>
@@ -5428,7 +5474,7 @@
     </p:spTree>
     <p:extLst>
       <p:ext uri="{BB962C8B-B14F-4D97-AF65-F5344CB8AC3E}">
-        <p14:creationId xmlns:p14="http://schemas.microsoft.com/office/powerpoint/2010/main" val="312047463"/>
+        <p14:creationId xmlns:p14="http://schemas.microsoft.com/office/powerpoint/2010/main" val="1452983415"/>
       </p:ext>
     </p:extLst>
   </p:cSld>
@@ -5518,221 +5564,10 @@
       </p:sp>
       <p:sp>
         <p:nvSpPr>
-          <p:cNvPr id="5" name="Title 1">
-            <a:extLst>
-              <a:ext uri="{FF2B5EF4-FFF2-40B4-BE49-F238E27FC236}">
-                <a16:creationId xmlns:a16="http://schemas.microsoft.com/office/drawing/2014/main" id="{3444037F-B658-D82C-5DCA-53E8AA1493D7}"/>
-              </a:ext>
-            </a:extLst>
-          </p:cNvPr>
-          <p:cNvSpPr txBox="1">
-            <a:spLocks/>
-          </p:cNvSpPr>
-          <p:nvPr/>
-        </p:nvSpPr>
-        <p:spPr>
-          <a:xfrm>
-            <a:off x="459204" y="1621910"/>
-            <a:ext cx="11273589" cy="4290585"/>
-          </a:xfrm>
-          <a:prstGeom prst="rect">
-            <a:avLst/>
-          </a:prstGeom>
-        </p:spPr>
-        <p:txBody>
-          <a:bodyPr vert="horz" lIns="91440" tIns="45720" rIns="91440" bIns="45720" rtlCol="0" anchor="b">
-            <a:normAutofit fontScale="97500"/>
-          </a:bodyPr>
-          <a:lstStyle>
-            <a:lvl1pPr algn="ctr" defTabSz="914400" rtl="0" eaLnBrk="1" latinLnBrk="0" hangingPunct="1">
-              <a:lnSpc>
-                <a:spcPct val="90000"/>
-              </a:lnSpc>
-              <a:spcBef>
-                <a:spcPct val="0"/>
-              </a:spcBef>
-              <a:buNone/>
-              <a:defRPr sz="6000" kern="1200">
-                <a:solidFill>
-                  <a:schemeClr val="tx1"/>
-                </a:solidFill>
-                <a:latin typeface="+mj-lt"/>
-                <a:ea typeface="+mj-ea"/>
-                <a:cs typeface="+mj-cs"/>
-              </a:defRPr>
-            </a:lvl1pPr>
-          </a:lstStyle>
-          <a:p>
-            <a:pPr algn="l"/>
-            <a:endParaRPr lang="en-US" sz="2900" b="1" i="0" dirty="0">
-              <a:solidFill>
-                <a:srgbClr val="252C33"/>
-              </a:solidFill>
-              <a:effectLst/>
-              <a:latin typeface="Calibri Body"/>
-            </a:endParaRPr>
-          </a:p>
-          <a:p>
-            <a:pPr algn="l"/>
-            <a:endParaRPr lang="en-US" sz="2900" b="1" dirty="0">
-              <a:latin typeface="Calibri Body"/>
-            </a:endParaRPr>
-          </a:p>
-          <a:p>
-            <a:pPr marL="457200" indent="-457200" algn="l">
-              <a:buFont typeface="Wingdings" pitchFamily="2" charset="2"/>
-              <a:buChar char="Ø"/>
-            </a:pPr>
-            <a:r>
-              <a:rPr lang="en-US" sz="2900" b="1" dirty="0">
-                <a:latin typeface="Calibri Body"/>
-              </a:rPr>
-              <a:t>What is </a:t>
-            </a:r>
-            <a:r>
-              <a:rPr lang="en-US" sz="2900" b="1">
-                <a:solidFill>
-                  <a:schemeClr val="tx1"/>
-                </a:solidFill>
-                <a:latin typeface="Calibri Body"/>
-              </a:rPr>
-              <a:t>Normal Equation?</a:t>
-            </a:r>
-            <a:endParaRPr lang="en-US" sz="2900" b="1" dirty="0">
-              <a:solidFill>
-                <a:schemeClr val="tx1"/>
-              </a:solidFill>
-              <a:latin typeface="Calibri Body"/>
-            </a:endParaRPr>
-          </a:p>
-          <a:p>
-            <a:pPr marL="457200" indent="-457200" algn="l">
-              <a:buFont typeface="Wingdings" pitchFamily="2" charset="2"/>
-              <a:buChar char="Ø"/>
-            </a:pPr>
-            <a:endParaRPr lang="en-US" sz="2900" b="1" dirty="0">
-              <a:latin typeface="Calibri Body"/>
-            </a:endParaRPr>
-          </a:p>
-          <a:p>
-            <a:pPr marL="457200" indent="-457200" algn="l">
-              <a:buFont typeface="Wingdings" pitchFamily="2" charset="2"/>
-              <a:buChar char="Ø"/>
-            </a:pPr>
-            <a:endParaRPr lang="en-US" sz="2900" b="1" dirty="0">
-              <a:solidFill>
-                <a:schemeClr val="tx1"/>
-              </a:solidFill>
-              <a:latin typeface="Calibri Body"/>
-            </a:endParaRPr>
-          </a:p>
-          <a:p>
-            <a:pPr marL="457200" indent="-457200" algn="l">
-              <a:buFont typeface="Wingdings" pitchFamily="2" charset="2"/>
-              <a:buChar char="Ø"/>
-            </a:pPr>
-            <a:endParaRPr lang="en-US" sz="2900" b="1" dirty="0">
-              <a:latin typeface="Calibri Body"/>
-            </a:endParaRPr>
-          </a:p>
-          <a:p>
-            <a:pPr marL="457200" indent="-457200" algn="l">
-              <a:buFont typeface="Wingdings" pitchFamily="2" charset="2"/>
-              <a:buChar char="Ø"/>
-            </a:pPr>
-            <a:endParaRPr lang="en-US" sz="2900" b="1" dirty="0">
-              <a:solidFill>
-                <a:schemeClr val="tx1"/>
-              </a:solidFill>
-              <a:latin typeface="Calibri Body"/>
-            </a:endParaRPr>
-          </a:p>
-          <a:p>
-            <a:pPr algn="l"/>
-            <a:r>
-              <a:rPr lang="en-US" sz="2900" b="1" dirty="0">
-                <a:solidFill>
-                  <a:schemeClr val="tx1">
-                    <a:lumMod val="50000"/>
-                    <a:lumOff val="50000"/>
-                  </a:schemeClr>
-                </a:solidFill>
-                <a:latin typeface="Calibri Body"/>
-              </a:rPr>
-              <a:t> </a:t>
-            </a:r>
-          </a:p>
-          <a:p>
-            <a:pPr algn="l"/>
-            <a:endParaRPr lang="en-US" sz="2900" b="1" i="0" dirty="0">
-              <a:solidFill>
-                <a:schemeClr val="tx1">
-                  <a:lumMod val="50000"/>
-                  <a:lumOff val="50000"/>
-                </a:schemeClr>
-              </a:solidFill>
-              <a:effectLst/>
-              <a:latin typeface="Calibri Body"/>
-            </a:endParaRPr>
-          </a:p>
-          <a:p>
-            <a:pPr marL="457200" indent="-457200" algn="l">
-              <a:buFont typeface="Wingdings" pitchFamily="2" charset="2"/>
-              <a:buChar char="Ø"/>
-            </a:pPr>
-            <a:endParaRPr lang="en-US" sz="2900" b="1" i="0" dirty="0">
-              <a:solidFill>
-                <a:schemeClr val="tx1">
-                  <a:lumMod val="50000"/>
-                  <a:lumOff val="50000"/>
-                </a:schemeClr>
-              </a:solidFill>
-              <a:effectLst/>
-              <a:latin typeface="Calibri Body"/>
-            </a:endParaRPr>
-          </a:p>
-          <a:p>
-            <a:pPr algn="l"/>
-            <a:endParaRPr lang="en-US" sz="2900" b="1" i="0" dirty="0">
-              <a:solidFill>
-                <a:srgbClr val="252C33"/>
-              </a:solidFill>
-              <a:effectLst/>
-              <a:latin typeface="Calibri Body"/>
-            </a:endParaRPr>
-          </a:p>
-          <a:p>
-            <a:pPr algn="l"/>
-            <a:endParaRPr lang="en-US" sz="2900" b="1" dirty="0">
-              <a:solidFill>
-                <a:schemeClr val="tx1">
-                  <a:lumMod val="50000"/>
-                  <a:lumOff val="50000"/>
-                </a:schemeClr>
-              </a:solidFill>
-              <a:latin typeface="Calibri Body"/>
-            </a:endParaRPr>
-          </a:p>
-          <a:p>
-            <a:pPr algn="l"/>
-            <a:endParaRPr lang="en-US" sz="2900" b="1" dirty="0">
-              <a:solidFill>
-                <a:schemeClr val="tx1">
-                  <a:lumMod val="50000"/>
-                  <a:lumOff val="50000"/>
-                </a:schemeClr>
-              </a:solidFill>
-              <a:latin typeface="Calibri Body"/>
-            </a:endParaRPr>
-          </a:p>
-        </p:txBody>
-      </p:sp>
-      <p:sp>
-        <p:nvSpPr>
           <p:cNvPr id="2" name="Title 1">
             <a:extLst>
               <a:ext uri="{FF2B5EF4-FFF2-40B4-BE49-F238E27FC236}">
-                <a16:creationId xmlns:a16="http://schemas.microsoft.com/office/drawing/2014/main" id="{95458FD9-390D-F590-F1F0-80A185D66971}"/>
+                <a16:creationId xmlns:a16="http://schemas.microsoft.com/office/drawing/2014/main" id="{E8FE4DC5-50CE-9CEE-1720-B3DB36475851}"/>
               </a:ext>
             </a:extLst>
           </p:cNvPr>
@@ -5745,7 +5580,7 @@
         </p:nvSpPr>
         <p:spPr>
           <a:xfrm>
-            <a:off x="459204" y="316674"/>
+            <a:off x="459205" y="329031"/>
             <a:ext cx="11273589" cy="718459"/>
           </a:xfrm>
         </p:spPr>
@@ -5755,18 +5590,106 @@
           </a:bodyPr>
           <a:lstStyle/>
           <a:p>
-            <a:pPr algn="l"/>
             <a:r>
-              <a:rPr lang="en-PH" sz="5000" b="1" dirty="0"/>
-              <a:t>Outline</a:t>
+              <a:rPr lang="en-US" b="1" dirty="0">
+                <a:latin typeface="Calibri Light (Headings)"/>
+              </a:rPr>
+              <a:t>The Normal Equation</a:t>
             </a:r>
+            <a:endParaRPr lang="en-PH" b="1" dirty="0">
+              <a:latin typeface="Calibri Light (Headings)"/>
+            </a:endParaRPr>
+          </a:p>
+        </p:txBody>
+      </p:sp>
+      <p:sp>
+        <p:nvSpPr>
+          <p:cNvPr id="6" name="TextBox 5">
+            <a:extLst>
+              <a:ext uri="{FF2B5EF4-FFF2-40B4-BE49-F238E27FC236}">
+                <a16:creationId xmlns:a16="http://schemas.microsoft.com/office/drawing/2014/main" id="{A852C17C-5432-6FB3-9E59-6819C1E0898A}"/>
+              </a:ext>
+            </a:extLst>
+          </p:cNvPr>
+          <p:cNvSpPr txBox="1"/>
+          <p:nvPr/>
+        </p:nvSpPr>
+        <p:spPr>
+          <a:xfrm>
+            <a:off x="985379" y="1317030"/>
+            <a:ext cx="10221239" cy="1477328"/>
+          </a:xfrm>
+          <a:prstGeom prst="rect">
+            <a:avLst/>
+          </a:prstGeom>
+          <a:noFill/>
+        </p:spPr>
+        <p:txBody>
+          <a:bodyPr wrap="square">
+            <a:spAutoFit/>
+          </a:bodyPr>
+          <a:lstStyle/>
+          <a:p>
+            <a:r>
+              <a:rPr lang="en-US" sz="3000" b="0" i="0" dirty="0">
+                <a:solidFill>
+                  <a:srgbClr val="273239"/>
+                </a:solidFill>
+                <a:effectLst/>
+                <a:latin typeface="Calibri (Body)"/>
+              </a:rPr>
+              <a:t>We know the Linear Regression model is a </a:t>
+            </a:r>
+            <a:r>
+              <a:rPr lang="en-US" sz="3000" b="1" i="0" dirty="0">
+                <a:solidFill>
+                  <a:srgbClr val="00B0F0"/>
+                </a:solidFill>
+                <a:effectLst/>
+                <a:latin typeface="Calibri (Body)"/>
+              </a:rPr>
+              <a:t>parameterized model </a:t>
+            </a:r>
+            <a:r>
+              <a:rPr lang="en-US" sz="3000" b="0" i="0" dirty="0">
+                <a:solidFill>
+                  <a:srgbClr val="273239"/>
+                </a:solidFill>
+                <a:effectLst/>
+                <a:latin typeface="Calibri (Body)"/>
+              </a:rPr>
+              <a:t>which means that the model’s behavior and predictions are determined by a set of </a:t>
+            </a:r>
+            <a:r>
+              <a:rPr lang="en-US" sz="3000" b="1" i="0" dirty="0">
+                <a:solidFill>
+                  <a:srgbClr val="00B0F0"/>
+                </a:solidFill>
+                <a:effectLst/>
+                <a:latin typeface="Calibri (Body)"/>
+              </a:rPr>
+              <a:t>parameters or coefficients in the model</a:t>
+            </a:r>
+            <a:r>
+              <a:rPr lang="en-US" sz="3000" b="0" i="0" dirty="0">
+                <a:solidFill>
+                  <a:srgbClr val="273239"/>
+                </a:solidFill>
+                <a:effectLst/>
+                <a:latin typeface="Calibri (Body)"/>
+              </a:rPr>
+              <a:t>. </a:t>
+            </a:r>
+            <a:endParaRPr lang="en-PH" sz="3000" dirty="0">
+              <a:latin typeface="Calibri (Body)"/>
+            </a:endParaRPr>
           </a:p>
         </p:txBody>
       </p:sp>
     </p:spTree>
     <p:extLst>
       <p:ext uri="{BB962C8B-B14F-4D97-AF65-F5344CB8AC3E}">
-        <p14:creationId xmlns:p14="http://schemas.microsoft.com/office/powerpoint/2010/main" val="2707103594"/>
+        <p14:creationId xmlns:p14="http://schemas.microsoft.com/office/powerpoint/2010/main" val="4008778383"/>
       </p:ext>
     </p:extLst>
   </p:cSld>
@@ -5883,14 +5806,12 @@
           <a:lstStyle/>
           <a:p>
             <a:r>
-              <a:rPr lang="en-US" b="1" dirty="0">
+              <a:rPr lang="en-US" sz="5400" b="1" dirty="0">
                 <a:latin typeface="Calibri Light (Headings)"/>
               </a:rPr>
               <a:t>The Normal Equation</a:t>
             </a:r>
-            <a:endParaRPr lang="en-PH" b="1" dirty="0">
-              <a:latin typeface="Calibri Light (Headings)"/>
-            </a:endParaRPr>
+            <a:endParaRPr lang="en-PH" sz="5400" b="1" dirty="0"/>
           </a:p>
         </p:txBody>
       </p:sp>
@@ -5908,8 +5829,8 @@
         </p:nvSpPr>
         <p:spPr>
           <a:xfrm>
-            <a:off x="985379" y="1317030"/>
-            <a:ext cx="10221239" cy="1477328"/>
+            <a:off x="985379" y="1304504"/>
+            <a:ext cx="10221239" cy="2862322"/>
           </a:xfrm>
           <a:prstGeom prst="rect">
             <a:avLst/>
@@ -5923,25 +5844,46 @@
           <a:lstStyle/>
           <a:p>
             <a:r>
-              <a:rPr lang="en-US" sz="3000" b="0" i="0" dirty="0">
+              <a:rPr lang="en-US" sz="3000" b="1" dirty="0">
                 <a:solidFill>
-                  <a:srgbClr val="273239"/>
+                  <a:srgbClr val="00B0F0"/>
                 </a:solidFill>
-                <a:effectLst/>
-                <a:latin typeface="Calibri (Body)"/>
               </a:rPr>
-              <a:t>We know the Linear Regression model is a parameterized model which means that the model’s behavior and predictions are determined by a set of parameters or coefficients in the model. </a:t>
+              <a:t>Normal Equation </a:t>
             </a:r>
-            <a:endParaRPr lang="en-PH" sz="3000" dirty="0">
-              <a:latin typeface="Calibri (Body)"/>
-            </a:endParaRPr>
+            <a:r>
+              <a:rPr lang="en-US" sz="3000" dirty="0"/>
+              <a:t>is an approach to Linear Regression with the Least Square Cost Function. </a:t>
+            </a:r>
+          </a:p>
+          <a:p>
+            <a:endParaRPr lang="en-US" sz="3000" dirty="0"/>
+          </a:p>
+          <a:p>
+            <a:r>
+              <a:rPr lang="en-US" sz="3000" dirty="0"/>
+              <a:t>We can use the normal equation to directly compute the parameters of a model that </a:t>
+            </a:r>
+            <a:r>
+              <a:rPr lang="en-US" sz="3000" b="1" dirty="0">
+                <a:solidFill>
+                  <a:srgbClr val="00B0F0"/>
+                </a:solidFill>
+              </a:rPr>
+              <a:t>minimizes the sum of the squared difference between the actual term and the predicted term</a:t>
+            </a:r>
+            <a:r>
+              <a:rPr lang="en-US" sz="3000" dirty="0"/>
+              <a:t>. </a:t>
+            </a:r>
+            <a:endParaRPr lang="en-PH" sz="3000" dirty="0"/>
           </a:p>
         </p:txBody>
       </p:sp>
     </p:spTree>
     <p:extLst>
       <p:ext uri="{BB962C8B-B14F-4D97-AF65-F5344CB8AC3E}">
-        <p14:creationId xmlns:p14="http://schemas.microsoft.com/office/powerpoint/2010/main" val="4008778383"/>
+        <p14:creationId xmlns:p14="http://schemas.microsoft.com/office/powerpoint/2010/main" val="104237171"/>
       </p:ext>
     </p:extLst>
   </p:cSld>
@@ -6029,190 +5971,8 @@
           </a:p>
         </p:txBody>
       </p:sp>
-      <p:sp>
-        <p:nvSpPr>
-          <p:cNvPr id="2" name="Title 1">
-            <a:extLst>
-              <a:ext uri="{FF2B5EF4-FFF2-40B4-BE49-F238E27FC236}">
-                <a16:creationId xmlns:a16="http://schemas.microsoft.com/office/drawing/2014/main" id="{E8FE4DC5-50CE-9CEE-1720-B3DB36475851}"/>
-              </a:ext>
-            </a:extLst>
-          </p:cNvPr>
-          <p:cNvSpPr>
-            <a:spLocks noGrp="1"/>
-          </p:cNvSpPr>
-          <p:nvPr>
-            <p:ph type="ctrTitle"/>
-          </p:nvPr>
-        </p:nvSpPr>
-        <p:spPr>
-          <a:xfrm>
-            <a:off x="459205" y="329031"/>
-            <a:ext cx="11273589" cy="718459"/>
-          </a:xfrm>
-        </p:spPr>
-        <p:txBody>
-          <a:bodyPr>
-            <a:noAutofit/>
-          </a:bodyPr>
-          <a:lstStyle/>
-          <a:p>
-            <a:r>
-              <a:rPr lang="en-US" sz="5400" b="1" dirty="0">
-                <a:latin typeface="Calibri Light (Headings)"/>
-              </a:rPr>
-              <a:t>The Normal Equation</a:t>
-            </a:r>
-            <a:endParaRPr lang="en-PH" sz="5400" b="1" dirty="0"/>
-          </a:p>
-        </p:txBody>
-      </p:sp>
-      <p:sp>
-        <p:nvSpPr>
-          <p:cNvPr id="6" name="TextBox 5">
-            <a:extLst>
-              <a:ext uri="{FF2B5EF4-FFF2-40B4-BE49-F238E27FC236}">
-                <a16:creationId xmlns:a16="http://schemas.microsoft.com/office/drawing/2014/main" id="{A852C17C-5432-6FB3-9E59-6819C1E0898A}"/>
-              </a:ext>
-            </a:extLst>
-          </p:cNvPr>
-          <p:cNvSpPr txBox="1"/>
-          <p:nvPr/>
-        </p:nvSpPr>
-        <p:spPr>
-          <a:xfrm>
-            <a:off x="985379" y="1304504"/>
-            <a:ext cx="10221239" cy="2862322"/>
-          </a:xfrm>
-          <a:prstGeom prst="rect">
-            <a:avLst/>
-          </a:prstGeom>
-          <a:noFill/>
-        </p:spPr>
-        <p:txBody>
-          <a:bodyPr wrap="square">
-            <a:spAutoFit/>
-          </a:bodyPr>
-          <a:lstStyle/>
-          <a:p>
-            <a:r>
-              <a:rPr lang="en-US" sz="3000" b="1" dirty="0">
-                <a:solidFill>
-                  <a:srgbClr val="00B0F0"/>
-                </a:solidFill>
-              </a:rPr>
-              <a:t>Normal Equation </a:t>
-            </a:r>
-            <a:r>
-              <a:rPr lang="en-US" sz="3000" dirty="0"/>
-              <a:t>is an approach to Linear Regression with a Least Square Cost Function. </a:t>
-            </a:r>
-          </a:p>
-          <a:p>
-            <a:endParaRPr lang="en-US" sz="3000" dirty="0"/>
-          </a:p>
-          <a:p>
-            <a:r>
-              <a:rPr lang="en-US" sz="3000" dirty="0"/>
-              <a:t>We can use the normal equation to directly compute the parameters of a model that minimizes the Sum of the squared difference between the actual term and the predicted term. </a:t>
-            </a:r>
-            <a:endParaRPr lang="en-PH" sz="3000" dirty="0"/>
-          </a:p>
-        </p:txBody>
-      </p:sp>
-    </p:spTree>
-    <p:extLst>
-      <p:ext uri="{BB962C8B-B14F-4D97-AF65-F5344CB8AC3E}">
-        <p14:creationId xmlns:p14="http://schemas.microsoft.com/office/powerpoint/2010/main" val="104237171"/>
-      </p:ext>
-    </p:extLst>
-  </p:cSld>
-  <p:clrMapOvr>
-    <a:masterClrMapping/>
-  </p:clrMapOvr>
-</p:sld>
-</file>
-
-<file path=ppt/slides/slide5.xml><?xml version="1.0" encoding="utf-8"?>
-<p:sld xmlns:a="http://schemas.openxmlformats.org/drawingml/2006/main" xmlns:r="http://schemas.openxmlformats.org/officeDocument/2006/relationships" xmlns:p="http://schemas.openxmlformats.org/presentationml/2006/main">
-  <p:cSld>
-    <p:bg>
-      <p:bgPr>
-        <a:blipFill dpi="0" rotWithShape="1">
-          <a:blip r:embed="rId3">
-            <a:alphaModFix amt="99000"/>
-            <a:lum/>
-          </a:blip>
-          <a:srcRect/>
-          <a:stretch>
-            <a:fillRect t="89000" r="85000" b="-1000"/>
-          </a:stretch>
-        </a:blipFill>
-        <a:effectLst/>
-      </p:bgPr>
-    </p:bg>
-    <p:spTree>
-      <p:nvGrpSpPr>
-        <p:cNvPr id="1" name=""/>
-        <p:cNvGrpSpPr/>
-        <p:nvPr/>
-      </p:nvGrpSpPr>
-      <p:grpSpPr>
-        <a:xfrm>
-          <a:off x="0" y="0"/>
-          <a:ext cx="0" cy="0"/>
-          <a:chOff x="0" y="0"/>
-          <a:chExt cx="0" cy="0"/>
-        </a:xfrm>
-      </p:grpSpPr>
-      <p:sp>
-        <p:nvSpPr>
-          <p:cNvPr id="4" name="Footer Placeholder 3">
-            <a:extLst>
-              <a:ext uri="{FF2B5EF4-FFF2-40B4-BE49-F238E27FC236}">
-                <a16:creationId xmlns:a16="http://schemas.microsoft.com/office/drawing/2014/main" id="{638E7DE1-45EE-476A-A474-0F3C264AEDA3}"/>
-              </a:ext>
-            </a:extLst>
-          </p:cNvPr>
-          <p:cNvSpPr>
-            <a:spLocks noGrp="1"/>
-          </p:cNvSpPr>
-          <p:nvPr>
-            <p:ph type="ftr" sz="quarter" idx="11"/>
-          </p:nvPr>
-        </p:nvSpPr>
-        <p:spPr>
-          <a:xfrm>
-            <a:off x="0" y="6139541"/>
-            <a:ext cx="12192000" cy="718459"/>
-          </a:xfrm>
-          <a:ln w="28575">
-            <a:solidFill>
-              <a:schemeClr val="accent5">
-                <a:lumMod val="50000"/>
-              </a:schemeClr>
-            </a:solidFill>
-          </a:ln>
-        </p:spPr>
-        <p:txBody>
-          <a:bodyPr/>
-          <a:lstStyle/>
-          <a:p>
-            <a:pPr algn="r"/>
-            <a:r>
-              <a:rPr lang="en-US" b="1" dirty="0">
-                <a:solidFill>
-                  <a:schemeClr val="tx1"/>
-                </a:solidFill>
-              </a:rPr>
-              <a:t>CCINSYSL</a:t>
-            </a:r>
-            <a:endParaRPr lang="en-PH" dirty="0"/>
-          </a:p>
-        </p:txBody>
-      </p:sp>
-      <mc:AlternateContent xmlns:mc="http://schemas.openxmlformats.org/markup-compatibility/2006">
-        <mc:Choice xmlns:a14="http://schemas.microsoft.com/office/drawing/2010/main" Requires="a14">
+      <mc:AlternateContent xmlns:mc="http://schemas.openxmlformats.org/markup-compatibility/2006" xmlns:a14="http://schemas.microsoft.com/office/drawing/2010/main">
+        <mc:Choice Requires="a14">
           <p:sp>
             <p:nvSpPr>
               <p:cNvPr id="2" name="Title 1">
@@ -6301,7 +6061,7 @@
             </p:txBody>
           </p:sp>
         </mc:Choice>
-        <mc:Fallback>
+        <mc:Fallback xmlns="">
           <p:sp>
             <p:nvSpPr>
               <p:cNvPr id="2" name="Title 1">
@@ -6408,7 +6168,7 @@
                             <a:latin typeface="Cambria Math" panose="02040503050406030204" pitchFamily="18" charset="0"/>
                             <a:ea typeface="Cambria Math" panose="02040503050406030204" pitchFamily="18" charset="0"/>
                           </a:rPr>
-                          <m:t>𝑨</m:t>
+                          <m:t>𝑿</m:t>
                         </m:r>
                       </m:e>
                       <m:sup>
@@ -6432,7 +6192,17 @@
                         <a:latin typeface="Cambria Math" panose="02040503050406030204" pitchFamily="18" charset="0"/>
                         <a:ea typeface="Cambria Math" panose="02040503050406030204" pitchFamily="18" charset="0"/>
                       </a:rPr>
-                      <m:t>𝑨𝒙</m:t>
+                      <m:t>𝑿</m:t>
+                    </m:r>
+                    <m:r>
+                      <a:rPr lang="en-US" sz="5000" b="1" i="1" smtClean="0">
+                        <a:solidFill>
+                          <a:schemeClr val="tx1"/>
+                        </a:solidFill>
+                        <a:latin typeface="Cambria Math" panose="02040503050406030204" pitchFamily="18" charset="0"/>
+                        <a:ea typeface="Cambria Math" panose="02040503050406030204" pitchFamily="18" charset="0"/>
+                      </a:rPr>
+                      <m:t>𝜽</m:t>
                     </m:r>
                     <m:r>
                       <a:rPr lang="en-US" sz="5000" b="1" i="1" smtClean="0">
@@ -6465,7 +6235,7 @@
                             <a:latin typeface="Cambria Math" panose="02040503050406030204" pitchFamily="18" charset="0"/>
                             <a:ea typeface="Cambria Math" panose="02040503050406030204" pitchFamily="18" charset="0"/>
                           </a:rPr>
-                          <m:t>𝑨</m:t>
+                          <m:t>𝑿</m:t>
                         </m:r>
                       </m:e>
                       <m:sup>
@@ -6489,7 +6259,7 @@
                         <a:latin typeface="Cambria Math" panose="02040503050406030204" pitchFamily="18" charset="0"/>
                         <a:ea typeface="Cambria Math" panose="02040503050406030204" pitchFamily="18" charset="0"/>
                       </a:rPr>
-                      <m:t>𝒃</m:t>
+                      <m:t>𝒚</m:t>
                     </m:r>
                   </m:oMath>
                 </a14:m>
@@ -6530,7 +6300,7 @@
               <a:blipFill>
                 <a:blip r:embed="rId5"/>
                 <a:stretch>
-                  <a:fillRect/>
+                  <a:fillRect r="-1603" b="-17391"/>
                 </a:stretch>
               </a:blipFill>
             </p:spPr>
@@ -6539,7 +6309,7 @@
               <a:lstStyle/>
               <a:p>
                 <a:r>
-                  <a:rPr lang="en-PH">
+                  <a:rPr lang="en-US">
                     <a:noFill/>
                   </a:rPr>
                   <a:t> </a:t>
@@ -6562,7 +6332,7 @@
 </p:sld>
 </file>
 
-<file path=ppt/slides/slide6.xml><?xml version="1.0" encoding="utf-8"?>
+<file path=ppt/slides/slide5.xml><?xml version="1.0" encoding="utf-8"?>
 <p:sld xmlns:a="http://schemas.openxmlformats.org/drawingml/2006/main" xmlns:r="http://schemas.openxmlformats.org/officeDocument/2006/relationships" xmlns:p="http://schemas.openxmlformats.org/presentationml/2006/main">
   <p:cSld>
     <p:bg>
@@ -6640,8 +6410,8 @@
           </a:p>
         </p:txBody>
       </p:sp>
-      <mc:AlternateContent xmlns:mc="http://schemas.openxmlformats.org/markup-compatibility/2006">
-        <mc:Choice xmlns:a14="http://schemas.microsoft.com/office/drawing/2010/main" Requires="a14">
+      <mc:AlternateContent xmlns:mc="http://schemas.openxmlformats.org/markup-compatibility/2006" xmlns:a14="http://schemas.microsoft.com/office/drawing/2010/main">
+        <mc:Choice Requires="a14">
           <p:sp>
             <p:nvSpPr>
               <p:cNvPr id="2" name="Title 1">
@@ -6670,6 +6440,7 @@
               </a:bodyPr>
               <a:lstStyle/>
               <a:p>
+                <a:pPr/>
                 <a14:m>
                   <m:oMathPara xmlns:m="http://schemas.openxmlformats.org/officeDocument/2006/math">
                     <m:oMathParaPr>
@@ -6729,7 +6500,7 @@
             </p:txBody>
           </p:sp>
         </mc:Choice>
-        <mc:Fallback>
+        <mc:Fallback xmlns="">
           <p:sp>
             <p:nvSpPr>
               <p:cNvPr id="2" name="Title 1">
@@ -7242,7 +7013,7 @@
 </p:sld>
 </file>
 
-<file path=ppt/slides/slide7.xml><?xml version="1.0" encoding="utf-8"?>
+<file path=ppt/slides/slide6.xml><?xml version="1.0" encoding="utf-8"?>
 <p:sld xmlns:a="http://schemas.openxmlformats.org/drawingml/2006/main" xmlns:r="http://schemas.openxmlformats.org/officeDocument/2006/relationships" xmlns:p="http://schemas.openxmlformats.org/presentationml/2006/main">
   <p:cSld>
     <p:bg>
@@ -7320,8 +7091,8 @@
           </a:p>
         </p:txBody>
       </p:sp>
-      <mc:AlternateContent xmlns:mc="http://schemas.openxmlformats.org/markup-compatibility/2006">
-        <mc:Choice xmlns:a14="http://schemas.microsoft.com/office/drawing/2010/main" Requires="a14">
+      <mc:AlternateContent xmlns:mc="http://schemas.openxmlformats.org/markup-compatibility/2006" xmlns:a14="http://schemas.microsoft.com/office/drawing/2010/main">
+        <mc:Choice Requires="a14">
           <p:sp>
             <p:nvSpPr>
               <p:cNvPr id="2" name="Title 1">
@@ -7350,6 +7121,7 @@
               </a:bodyPr>
               <a:lstStyle/>
               <a:p>
+                <a:pPr/>
                 <a14:m>
                   <m:oMathPara xmlns:m="http://schemas.openxmlformats.org/officeDocument/2006/math">
                     <m:oMathParaPr>
@@ -7409,7 +7181,7 @@
             </p:txBody>
           </p:sp>
         </mc:Choice>
-        <mc:Fallback>
+        <mc:Fallback xmlns="">
           <p:sp>
             <p:nvSpPr>
               <p:cNvPr id="2" name="Title 1">
@@ -7913,10 +7685,10 @@
         <mc:Choice xmlns:a14="http://schemas.microsoft.com/office/drawing/2010/main" Requires="a14">
           <p:sp>
             <p:nvSpPr>
-              <p:cNvPr id="3" name="TextBox 2">
+              <p:cNvPr id="8" name="TextBox 7">
                 <a:extLst>
                   <a:ext uri="{FF2B5EF4-FFF2-40B4-BE49-F238E27FC236}">
-                    <a16:creationId xmlns:a16="http://schemas.microsoft.com/office/drawing/2014/main" id="{0A7016F7-FD39-8740-140E-944F893AA970}"/>
+                    <a16:creationId xmlns:a16="http://schemas.microsoft.com/office/drawing/2014/main" id="{E1719EF6-8F98-2BAF-F0FE-58B98B7E262A}"/>
                   </a:ext>
                 </a:extLst>
               </p:cNvPr>
@@ -7925,8 +7697,8 @@
             </p:nvSpPr>
             <p:spPr>
               <a:xfrm>
-                <a:off x="6263867" y="2441154"/>
-                <a:ext cx="2945130" cy="1257845"/>
+                <a:off x="5633290" y="4101755"/>
+                <a:ext cx="5834810" cy="1220847"/>
               </a:xfrm>
               <a:prstGeom prst="rect">
                 <a:avLst/>
@@ -7946,6 +7718,7 @@
                         <m:ctrlPr>
                           <a:rPr lang="en-PH" sz="3000" i="1" smtClean="0">
                             <a:latin typeface="Cambria Math" panose="02040503050406030204" pitchFamily="18" charset="0"/>
+                            <a:ea typeface="Cambria Math" panose="02040503050406030204" pitchFamily="18" charset="0"/>
                           </a:rPr>
                         </m:ctrlPr>
                       </m:dPr>
@@ -7953,8 +7726,9 @@
                         <m:eqArr>
                           <m:eqArrPr>
                             <m:ctrlPr>
-                              <a:rPr lang="en-PH" sz="3000" i="1" smtClean="0">
+                              <a:rPr lang="en-US" sz="3000" b="0" i="1" smtClean="0">
                                 <a:latin typeface="Cambria Math" panose="02040503050406030204" pitchFamily="18" charset="0"/>
+                                <a:ea typeface="Cambria Math" panose="02040503050406030204" pitchFamily="18" charset="0"/>
                               </a:rPr>
                             </m:ctrlPr>
                           </m:eqArrPr>
@@ -7962,6 +7736,74 @@
                             <m:r>
                               <a:rPr lang="en-US" sz="3000" b="0" i="1" smtClean="0">
                                 <a:latin typeface="Cambria Math" panose="02040503050406030204" pitchFamily="18" charset="0"/>
+                                <a:ea typeface="Cambria Math" panose="02040503050406030204" pitchFamily="18" charset="0"/>
+                              </a:rPr>
+                              <m:t>1 1 1</m:t>
+                            </m:r>
+                          </m:e>
+                          <m:e>
+                            <m:r>
+                              <a:rPr lang="en-US" sz="3000" b="0" i="1" smtClean="0">
+                                <a:latin typeface="Cambria Math" panose="02040503050406030204" pitchFamily="18" charset="0"/>
+                                <a:ea typeface="Cambria Math" panose="02040503050406030204" pitchFamily="18" charset="0"/>
+                              </a:rPr>
+                              <m:t>1 2 3</m:t>
+                            </m:r>
+                          </m:e>
+                        </m:eqArr>
+                      </m:e>
+                    </m:d>
+                  </m:oMath>
+                </a14:m>
+                <a:r>
+                  <a:rPr lang="en-PH" sz="3000" dirty="0">
+                    <a:latin typeface="Cambria Math" panose="02040503050406030204" pitchFamily="18" charset="0"/>
+                    <a:ea typeface="Cambria Math" panose="02040503050406030204" pitchFamily="18" charset="0"/>
+                  </a:rPr>
+                  <a:t>  </a:t>
+                </a:r>
+                <a14:m>
+                  <m:oMath xmlns:m="http://schemas.openxmlformats.org/officeDocument/2006/math">
+                    <m:d>
+                      <m:dPr>
+                        <m:ctrlPr>
+                          <a:rPr lang="en-PH" sz="3000" i="1" smtClean="0">
+                            <a:latin typeface="Cambria Math" panose="02040503050406030204" pitchFamily="18" charset="0"/>
+                            <a:ea typeface="Cambria Math" panose="02040503050406030204" pitchFamily="18" charset="0"/>
+                          </a:rPr>
+                        </m:ctrlPr>
+                      </m:dPr>
+                      <m:e>
+                        <m:eqArr>
+                          <m:eqArrPr>
+                            <m:ctrlPr>
+                              <a:rPr lang="en-PH" sz="3000" i="1">
+                                <a:latin typeface="Cambria Math" panose="02040503050406030204" pitchFamily="18" charset="0"/>
+                                <a:ea typeface="Cambria Math" panose="02040503050406030204" pitchFamily="18" charset="0"/>
+                              </a:rPr>
+                            </m:ctrlPr>
+                          </m:eqArrPr>
+                          <m:e>
+                            <m:r>
+                              <a:rPr lang="en-US" sz="3000" i="1">
+                                <a:latin typeface="Cambria Math" panose="02040503050406030204" pitchFamily="18" charset="0"/>
+                                <a:ea typeface="Cambria Math" panose="02040503050406030204" pitchFamily="18" charset="0"/>
+                              </a:rPr>
+                              <m:t>1</m:t>
+                            </m:r>
+                            <m:r>
+                              <a:rPr lang="en-US" sz="3000" b="0" i="1" smtClean="0">
+                                <a:latin typeface="Cambria Math" panose="02040503050406030204" pitchFamily="18" charset="0"/>
+                                <a:ea typeface="Cambria Math" panose="02040503050406030204" pitchFamily="18" charset="0"/>
+                              </a:rPr>
+                              <m:t> </m:t>
+                            </m:r>
+                          </m:e>
+                          <m:e>
+                            <m:r>
+                              <a:rPr lang="en-US" sz="3000" b="0" i="1" smtClean="0">
+                                <a:latin typeface="Cambria Math" panose="02040503050406030204" pitchFamily="18" charset="0"/>
+                                <a:ea typeface="Cambria Math" panose="02040503050406030204" pitchFamily="18" charset="0"/>
                               </a:rPr>
                               <m:t>1</m:t>
                             </m:r>
@@ -7970,14 +7812,206 @@
                             <m:r>
                               <a:rPr lang="en-US" sz="3000" b="0" i="1" smtClean="0">
                                 <a:latin typeface="Cambria Math" panose="02040503050406030204" pitchFamily="18" charset="0"/>
+                                <a:ea typeface="Cambria Math" panose="02040503050406030204" pitchFamily="18" charset="0"/>
+                              </a:rPr>
+                              <m:t>1</m:t>
+                            </m:r>
+                          </m:e>
+                        </m:eqArr>
+                        <m:eqArr>
+                          <m:eqArrPr>
+                            <m:ctrlPr>
+                              <a:rPr lang="en-PH" sz="3000" i="1">
+                                <a:latin typeface="Cambria Math" panose="02040503050406030204" pitchFamily="18" charset="0"/>
+                                <a:ea typeface="Cambria Math" panose="02040503050406030204" pitchFamily="18" charset="0"/>
+                              </a:rPr>
+                            </m:ctrlPr>
+                          </m:eqArrPr>
+                          <m:e>
+                            <m:r>
+                              <a:rPr lang="en-US" sz="3000" i="1">
+                                <a:latin typeface="Cambria Math" panose="02040503050406030204" pitchFamily="18" charset="0"/>
+                                <a:ea typeface="Cambria Math" panose="02040503050406030204" pitchFamily="18" charset="0"/>
+                              </a:rPr>
+                              <m:t>1</m:t>
+                            </m:r>
+                          </m:e>
+                          <m:e>
+                            <m:r>
+                              <a:rPr lang="en-US" sz="3000" b="0" i="1" smtClean="0">
+                                <a:latin typeface="Cambria Math" panose="02040503050406030204" pitchFamily="18" charset="0"/>
+                                <a:ea typeface="Cambria Math" panose="02040503050406030204" pitchFamily="18" charset="0"/>
+                              </a:rPr>
+                              <m:t> 2</m:t>
+                            </m:r>
+                          </m:e>
+                          <m:e>
+                            <m:r>
+                              <a:rPr lang="en-US" sz="3000" b="0" i="1" smtClean="0">
+                                <a:latin typeface="Cambria Math" panose="02040503050406030204" pitchFamily="18" charset="0"/>
+                                <a:ea typeface="Cambria Math" panose="02040503050406030204" pitchFamily="18" charset="0"/>
+                              </a:rPr>
+                              <m:t> 3</m:t>
+                            </m:r>
+                          </m:e>
+                        </m:eqArr>
+                      </m:e>
+                    </m:d>
+                  </m:oMath>
+                </a14:m>
+                <a:r>
+                  <a:rPr lang="en-PH" sz="3000" dirty="0">
+                    <a:latin typeface="Cambria Math" panose="02040503050406030204" pitchFamily="18" charset="0"/>
+                    <a:ea typeface="Cambria Math" panose="02040503050406030204" pitchFamily="18" charset="0"/>
+                  </a:rPr>
+                  <a:t>  </a:t>
+                </a:r>
+                <a14:m>
+                  <m:oMath xmlns:m="http://schemas.openxmlformats.org/officeDocument/2006/math">
+                    <m:d>
+                      <m:dPr>
+                        <m:ctrlPr>
+                          <a:rPr lang="en-PH" sz="3000" i="1">
+                            <a:latin typeface="Cambria Math" panose="02040503050406030204" pitchFamily="18" charset="0"/>
+                            <a:ea typeface="Cambria Math" panose="02040503050406030204" pitchFamily="18" charset="0"/>
+                          </a:rPr>
+                        </m:ctrlPr>
+                      </m:dPr>
+                      <m:e>
+                        <m:eqArr>
+                          <m:eqArrPr>
+                            <m:ctrlPr>
+                              <a:rPr lang="en-US" sz="3000" i="1">
+                                <a:latin typeface="Cambria Math" panose="02040503050406030204" pitchFamily="18" charset="0"/>
+                                <a:ea typeface="Cambria Math" panose="02040503050406030204" pitchFamily="18" charset="0"/>
+                              </a:rPr>
+                            </m:ctrlPr>
+                          </m:eqArrPr>
+                          <m:e>
+                            <m:r>
+                              <a:rPr lang="en-US" sz="3000" b="0" i="1" smtClean="0">
+                                <a:latin typeface="Cambria Math" panose="02040503050406030204" pitchFamily="18" charset="0"/>
+                                <a:ea typeface="Cambria Math" panose="02040503050406030204" pitchFamily="18" charset="0"/>
+                              </a:rPr>
+                              <m:t>𝑏</m:t>
+                            </m:r>
+                          </m:e>
+                          <m:e>
+                            <m:r>
+                              <a:rPr lang="en-US" sz="3000" b="0" i="1" smtClean="0">
+                                <a:latin typeface="Cambria Math" panose="02040503050406030204" pitchFamily="18" charset="0"/>
+                                <a:ea typeface="Cambria Math" panose="02040503050406030204" pitchFamily="18" charset="0"/>
+                              </a:rPr>
+                              <m:t>𝑚</m:t>
+                            </m:r>
+                          </m:e>
+                        </m:eqArr>
+                      </m:e>
+                    </m:d>
+                  </m:oMath>
+                </a14:m>
+                <a:r>
+                  <a:rPr lang="en-PH" sz="3000" dirty="0">
+                    <a:latin typeface="Cambria Math" panose="02040503050406030204" pitchFamily="18" charset="0"/>
+                    <a:ea typeface="Cambria Math" panose="02040503050406030204" pitchFamily="18" charset="0"/>
+                  </a:rPr>
+                  <a:t> = </a:t>
+                </a:r>
+                <a14:m>
+                  <m:oMath xmlns:m="http://schemas.openxmlformats.org/officeDocument/2006/math">
+                    <m:d>
+                      <m:dPr>
+                        <m:ctrlPr>
+                          <a:rPr lang="en-PH" sz="3000" i="1">
+                            <a:latin typeface="Cambria Math" panose="02040503050406030204" pitchFamily="18" charset="0"/>
+                            <a:ea typeface="Cambria Math" panose="02040503050406030204" pitchFamily="18" charset="0"/>
+                          </a:rPr>
+                        </m:ctrlPr>
+                      </m:dPr>
+                      <m:e>
+                        <m:eqArr>
+                          <m:eqArrPr>
+                            <m:ctrlPr>
+                              <a:rPr lang="en-US" sz="3000" i="1">
+                                <a:latin typeface="Cambria Math" panose="02040503050406030204" pitchFamily="18" charset="0"/>
+                                <a:ea typeface="Cambria Math" panose="02040503050406030204" pitchFamily="18" charset="0"/>
+                              </a:rPr>
+                            </m:ctrlPr>
+                          </m:eqArrPr>
+                          <m:e>
+                            <m:r>
+                              <a:rPr lang="en-US" sz="3000" i="1">
+                                <a:latin typeface="Cambria Math" panose="02040503050406030204" pitchFamily="18" charset="0"/>
+                                <a:ea typeface="Cambria Math" panose="02040503050406030204" pitchFamily="18" charset="0"/>
+                              </a:rPr>
+                              <m:t>1 1 1</m:t>
+                            </m:r>
+                          </m:e>
+                          <m:e>
+                            <m:r>
+                              <a:rPr lang="en-US" sz="3000" i="1">
+                                <a:latin typeface="Cambria Math" panose="02040503050406030204" pitchFamily="18" charset="0"/>
+                                <a:ea typeface="Cambria Math" panose="02040503050406030204" pitchFamily="18" charset="0"/>
+                              </a:rPr>
+                              <m:t>1 2 3</m:t>
+                            </m:r>
+                          </m:e>
+                        </m:eqArr>
+                      </m:e>
+                    </m:d>
+                  </m:oMath>
+                </a14:m>
+                <a:r>
+                  <a:rPr lang="en-PH" sz="3000" dirty="0">
+                    <a:latin typeface="Cambria Math" panose="02040503050406030204" pitchFamily="18" charset="0"/>
+                    <a:ea typeface="Cambria Math" panose="02040503050406030204" pitchFamily="18" charset="0"/>
+                  </a:rPr>
+                  <a:t> </a:t>
+                </a:r>
+                <a14:m>
+                  <m:oMath xmlns:m="http://schemas.openxmlformats.org/officeDocument/2006/math">
+                    <m:d>
+                      <m:dPr>
+                        <m:ctrlPr>
+                          <a:rPr lang="en-PH" sz="3000" i="1">
+                            <a:latin typeface="Cambria Math" panose="02040503050406030204" pitchFamily="18" charset="0"/>
+                            <a:ea typeface="Cambria Math" panose="02040503050406030204" pitchFamily="18" charset="0"/>
+                          </a:rPr>
+                        </m:ctrlPr>
+                      </m:dPr>
+                      <m:e>
+                        <m:eqArr>
+                          <m:eqArrPr>
+                            <m:ctrlPr>
+                              <a:rPr lang="en-PH" sz="3000" i="1">
+                                <a:latin typeface="Cambria Math" panose="02040503050406030204" pitchFamily="18" charset="0"/>
+                                <a:ea typeface="Cambria Math" panose="02040503050406030204" pitchFamily="18" charset="0"/>
+                              </a:rPr>
+                            </m:ctrlPr>
+                          </m:eqArrPr>
+                          <m:e>
+                            <m:r>
+                              <a:rPr lang="en-US" sz="3000" i="1">
+                                <a:latin typeface="Cambria Math" panose="02040503050406030204" pitchFamily="18" charset="0"/>
+                                <a:ea typeface="Cambria Math" panose="02040503050406030204" pitchFamily="18" charset="0"/>
+                              </a:rPr>
+                              <m:t>1</m:t>
+                            </m:r>
+                          </m:e>
+                          <m:e>
+                            <m:r>
+                              <a:rPr lang="en-US" sz="3000" i="1">
+                                <a:latin typeface="Cambria Math" panose="02040503050406030204" pitchFamily="18" charset="0"/>
+                                <a:ea typeface="Cambria Math" panose="02040503050406030204" pitchFamily="18" charset="0"/>
                               </a:rPr>
                               <m:t>3</m:t>
                             </m:r>
                           </m:e>
                           <m:e>
                             <m:r>
-                              <a:rPr lang="en-US" sz="3000" b="0" i="1" smtClean="0">
+                              <a:rPr lang="en-US" sz="3000" i="1">
                                 <a:latin typeface="Cambria Math" panose="02040503050406030204" pitchFamily="18" charset="0"/>
+                                <a:ea typeface="Cambria Math" panose="02040503050406030204" pitchFamily="18" charset="0"/>
                               </a:rPr>
                               <m:t>2</m:t>
                             </m:r>
@@ -7988,154 +8022,10 @@
                   </m:oMath>
                 </a14:m>
                 <a:r>
-                  <a:rPr lang="en-PH" sz="3000" dirty="0"/>
-                  <a:t> = </a:t>
-                </a:r>
-                <a14:m>
-                  <m:oMath xmlns:m="http://schemas.openxmlformats.org/officeDocument/2006/math">
-                    <m:d>
-                      <m:dPr>
-                        <m:ctrlPr>
-                          <a:rPr lang="en-PH" sz="3000" i="1" smtClean="0">
-                            <a:latin typeface="Cambria Math" panose="02040503050406030204" pitchFamily="18" charset="0"/>
-                          </a:rPr>
-                        </m:ctrlPr>
-                      </m:dPr>
-                      <m:e>
-                        <m:eqArr>
-                          <m:eqArrPr>
-                            <m:ctrlPr>
-                              <a:rPr lang="en-PH" sz="3000" i="1">
-                                <a:latin typeface="Cambria Math" panose="02040503050406030204" pitchFamily="18" charset="0"/>
-                              </a:rPr>
-                            </m:ctrlPr>
-                          </m:eqArrPr>
-                          <m:e>
-                            <m:r>
-                              <a:rPr lang="en-US" sz="3000" i="1">
-                                <a:latin typeface="Cambria Math" panose="02040503050406030204" pitchFamily="18" charset="0"/>
-                              </a:rPr>
-                              <m:t>1</m:t>
-                            </m:r>
-                            <m:r>
-                              <a:rPr lang="en-US" sz="3000" b="0" i="1" smtClean="0">
-                                <a:latin typeface="Cambria Math" panose="02040503050406030204" pitchFamily="18" charset="0"/>
-                              </a:rPr>
-                              <m:t> </m:t>
-                            </m:r>
-                          </m:e>
-                          <m:e>
-                            <m:r>
-                              <a:rPr lang="en-US" sz="3000" b="0" i="1" smtClean="0">
-                                <a:latin typeface="Cambria Math" panose="02040503050406030204" pitchFamily="18" charset="0"/>
-                              </a:rPr>
-                              <m:t>1</m:t>
-                            </m:r>
-                          </m:e>
-                          <m:e>
-                            <m:r>
-                              <a:rPr lang="en-US" sz="3000" b="0" i="1" smtClean="0">
-                                <a:latin typeface="Cambria Math" panose="02040503050406030204" pitchFamily="18" charset="0"/>
-                              </a:rPr>
-                              <m:t>1</m:t>
-                            </m:r>
-                          </m:e>
-                        </m:eqArr>
-                        <m:eqArr>
-                          <m:eqArrPr>
-                            <m:ctrlPr>
-                              <a:rPr lang="en-PH" sz="3000" i="1">
-                                <a:latin typeface="Cambria Math" panose="02040503050406030204" pitchFamily="18" charset="0"/>
-                              </a:rPr>
-                            </m:ctrlPr>
-                          </m:eqArrPr>
-                          <m:e>
-                            <m:r>
-                              <a:rPr lang="en-US" sz="3000" i="1">
-                                <a:latin typeface="Cambria Math" panose="02040503050406030204" pitchFamily="18" charset="0"/>
-                              </a:rPr>
-                              <m:t>1</m:t>
-                            </m:r>
-                          </m:e>
-                          <m:e>
-                            <m:r>
-                              <a:rPr lang="en-US" sz="3000" b="0" i="1" smtClean="0">
-                                <a:latin typeface="Cambria Math" panose="02040503050406030204" pitchFamily="18" charset="0"/>
-                              </a:rPr>
-                              <m:t> </m:t>
-                            </m:r>
-                            <m:r>
-                              <a:rPr lang="en-US" sz="3000" b="0" i="1" smtClean="0">
-                                <a:latin typeface="Cambria Math" panose="02040503050406030204" pitchFamily="18" charset="0"/>
-                              </a:rPr>
-                              <m:t>2</m:t>
-                            </m:r>
-                          </m:e>
-                          <m:e>
-                            <m:r>
-                              <a:rPr lang="en-US" sz="3000" b="0" i="1" smtClean="0">
-                                <a:latin typeface="Cambria Math" panose="02040503050406030204" pitchFamily="18" charset="0"/>
-                              </a:rPr>
-                              <m:t> </m:t>
-                            </m:r>
-                            <m:r>
-                              <a:rPr lang="en-US" sz="3000" b="0" i="1" smtClean="0">
-                                <a:latin typeface="Cambria Math" panose="02040503050406030204" pitchFamily="18" charset="0"/>
-                              </a:rPr>
-                              <m:t>3</m:t>
-                            </m:r>
-                          </m:e>
-                        </m:eqArr>
-                      </m:e>
-                    </m:d>
-                  </m:oMath>
-                </a14:m>
-                <a:r>
-                  <a:rPr lang="en-PH" sz="3000" dirty="0"/>
-                  <a:t> </a:t>
-                </a:r>
-                <a14:m>
-                  <m:oMath xmlns:m="http://schemas.openxmlformats.org/officeDocument/2006/math">
-                    <m:d>
-                      <m:dPr>
-                        <m:ctrlPr>
-                          <a:rPr lang="en-PH" sz="3000" i="1">
-                            <a:latin typeface="Cambria Math" panose="02040503050406030204" pitchFamily="18" charset="0"/>
-                          </a:rPr>
-                        </m:ctrlPr>
-                      </m:dPr>
-                      <m:e>
-                        <m:eqArr>
-                          <m:eqArrPr>
-                            <m:ctrlPr>
-                              <a:rPr lang="en-US" sz="3000" i="1">
-                                <a:latin typeface="Cambria Math" panose="02040503050406030204" pitchFamily="18" charset="0"/>
-                              </a:rPr>
-                            </m:ctrlPr>
-                          </m:eqArrPr>
-                          <m:e>
-                            <m:r>
-                              <a:rPr lang="en-US" sz="3000" b="0" i="1" smtClean="0">
-                                <a:latin typeface="Cambria Math" panose="02040503050406030204" pitchFamily="18" charset="0"/>
-                              </a:rPr>
-                              <m:t>𝑏</m:t>
-                            </m:r>
-                          </m:e>
-                          <m:e>
-                            <m:r>
-                              <a:rPr lang="en-US" sz="3000" b="0" i="1" smtClean="0">
-                                <a:latin typeface="Cambria Math" panose="02040503050406030204" pitchFamily="18" charset="0"/>
-                              </a:rPr>
-                              <m:t>𝑚</m:t>
-                            </m:r>
-                          </m:e>
-                        </m:eqArr>
-                      </m:e>
-                    </m:d>
-                  </m:oMath>
-                </a14:m>
-                <a:r>
-                  <a:rPr lang="en-PH" sz="3000" dirty="0"/>
+                  <a:rPr lang="en-PH" sz="3000" dirty="0">
+                    <a:latin typeface="Cambria Math" panose="02040503050406030204" pitchFamily="18" charset="0"/>
+                    <a:ea typeface="Cambria Math" panose="02040503050406030204" pitchFamily="18" charset="0"/>
+                  </a:rPr>
                   <a:t> </a:t>
                 </a:r>
               </a:p>
@@ -8145,10 +8035,10 @@
         <mc:Fallback>
           <p:sp>
             <p:nvSpPr>
-              <p:cNvPr id="3" name="TextBox 2">
+              <p:cNvPr id="8" name="TextBox 7">
                 <a:extLst>
                   <a:ext uri="{FF2B5EF4-FFF2-40B4-BE49-F238E27FC236}">
-                    <a16:creationId xmlns:a16="http://schemas.microsoft.com/office/drawing/2014/main" id="{0A7016F7-FD39-8740-140E-944F893AA970}"/>
+                    <a16:creationId xmlns:a16="http://schemas.microsoft.com/office/drawing/2014/main" id="{E1719EF6-8F98-2BAF-F0FE-58B98B7E262A}"/>
                   </a:ext>
                 </a:extLst>
               </p:cNvPr>
@@ -8159,8 +8049,8 @@
             </p:nvSpPr>
             <p:spPr>
               <a:xfrm>
-                <a:off x="6263867" y="2441154"/>
-                <a:ext cx="2945130" cy="1257845"/>
+                <a:off x="5633290" y="4101755"/>
+                <a:ext cx="5834810" cy="1220847"/>
               </a:xfrm>
               <a:prstGeom prst="rect">
                 <a:avLst/>
@@ -8168,7 +8058,7 @@
               <a:blipFill>
                 <a:blip r:embed="rId5"/>
                 <a:stretch>
-                  <a:fillRect/>
+                  <a:fillRect t="-7216" b="-20619"/>
                 </a:stretch>
               </a:blipFill>
             </p:spPr>
@@ -8177,7 +8067,7 @@
               <a:lstStyle/>
               <a:p>
                 <a:r>
-                  <a:rPr lang="en-PH">
+                  <a:rPr lang="en-US">
                     <a:noFill/>
                   </a:rPr>
                   <a:t> </a:t>
@@ -8191,10 +8081,10 @@
         <mc:Choice xmlns:a14="http://schemas.microsoft.com/office/drawing/2010/main" Requires="a14">
           <p:sp>
             <p:nvSpPr>
-              <p:cNvPr id="5" name="TextBox 4">
+              <p:cNvPr id="9" name="TextBox 8">
                 <a:extLst>
                   <a:ext uri="{FF2B5EF4-FFF2-40B4-BE49-F238E27FC236}">
-                    <a16:creationId xmlns:a16="http://schemas.microsoft.com/office/drawing/2014/main" id="{18CE3913-4106-AC3B-D7D0-EB881D56C0C4}"/>
+                    <a16:creationId xmlns:a16="http://schemas.microsoft.com/office/drawing/2014/main" id="{E075BBE6-0DC4-9B95-5325-B9D414C92E54}"/>
                   </a:ext>
                 </a:extLst>
               </p:cNvPr>
@@ -8203,8 +8093,8 @@
             </p:nvSpPr>
             <p:spPr>
               <a:xfrm>
-                <a:off x="6096000" y="1329115"/>
-                <a:ext cx="3280864" cy="707886"/>
+                <a:off x="5992320" y="2160743"/>
+                <a:ext cx="3963811" cy="875496"/>
               </a:xfrm>
               <a:prstGeom prst="rect">
                 <a:avLst/>
@@ -8212,33 +8102,82 @@
               <a:noFill/>
             </p:spPr>
             <p:txBody>
-              <a:bodyPr wrap="square" rtlCol="0">
+              <a:bodyPr wrap="square">
                 <a:spAutoFit/>
               </a:bodyPr>
               <a:lstStyle/>
               <a:p>
                 <a:r>
-                  <a:rPr lang="en-US" sz="4000" b="1" dirty="0">
-                    <a:solidFill>
-                      <a:srgbClr val="00B050"/>
-                    </a:solidFill>
-                    <a:ea typeface="Cambria Math" panose="02040503050406030204" pitchFamily="18" charset="0"/>
-                  </a:rPr>
-                  <a:t>Y</a:t>
-                </a:r>
-                <a:r>
-                  <a:rPr lang="en-US" sz="4000" b="1" dirty="0">
+                  <a:rPr lang="en-US" sz="5000" b="1" dirty="0">
                     <a:solidFill>
                       <a:schemeClr val="tx1"/>
                     </a:solidFill>
+                    <a:latin typeface="Cambria Math" panose="02040503050406030204" pitchFamily="18" charset="0"/>
                     <a:ea typeface="Cambria Math" panose="02040503050406030204" pitchFamily="18" charset="0"/>
                   </a:rPr>
                   <a:t> </a:t>
                 </a:r>
                 <a14:m>
                   <m:oMath xmlns:m="http://schemas.openxmlformats.org/officeDocument/2006/math">
+                    <m:sSup>
+                      <m:sSupPr>
+                        <m:ctrlPr>
+                          <a:rPr lang="en-US" sz="5000" b="1" i="1" smtClean="0">
+                            <a:solidFill>
+                              <a:schemeClr val="tx1"/>
+                            </a:solidFill>
+                            <a:latin typeface="Cambria Math" panose="02040503050406030204" pitchFamily="18" charset="0"/>
+                            <a:ea typeface="Cambria Math" panose="02040503050406030204" pitchFamily="18" charset="0"/>
+                          </a:rPr>
+                        </m:ctrlPr>
+                      </m:sSupPr>
+                      <m:e>
+                        <m:r>
+                          <a:rPr lang="en-US" sz="5000" b="1" i="1" smtClean="0">
+                            <a:solidFill>
+                              <a:schemeClr val="tx1"/>
+                            </a:solidFill>
+                            <a:latin typeface="Cambria Math" panose="02040503050406030204" pitchFamily="18" charset="0"/>
+                            <a:ea typeface="Cambria Math" panose="02040503050406030204" pitchFamily="18" charset="0"/>
+                          </a:rPr>
+                          <m:t>𝑿</m:t>
+                        </m:r>
+                      </m:e>
+                      <m:sup>
+                        <m:r>
+                          <a:rPr lang="en-US" sz="5000" b="1" i="1" smtClean="0">
+                            <a:solidFill>
+                              <a:schemeClr val="tx1"/>
+                            </a:solidFill>
+                            <a:latin typeface="Cambria Math" panose="02040503050406030204" pitchFamily="18" charset="0"/>
+                            <a:ea typeface="Cambria Math" panose="02040503050406030204" pitchFamily="18" charset="0"/>
+                          </a:rPr>
+                          <m:t>𝑻</m:t>
+                        </m:r>
+                      </m:sup>
+                    </m:sSup>
                     <m:r>
-                      <a:rPr lang="en-US" sz="4000" b="1" i="1" smtClean="0">
+                      <a:rPr lang="en-US" sz="5000" b="1" i="1" smtClean="0">
+                        <a:solidFill>
+                          <a:schemeClr val="tx1"/>
+                        </a:solidFill>
+                        <a:latin typeface="Cambria Math" panose="02040503050406030204" pitchFamily="18" charset="0"/>
+                        <a:ea typeface="Cambria Math" panose="02040503050406030204" pitchFamily="18" charset="0"/>
+                      </a:rPr>
+                      <m:t>𝑿</m:t>
+                    </m:r>
+                    <m:r>
+                      <a:rPr lang="en-US" sz="5000" b="1" i="1" smtClean="0">
+                        <a:solidFill>
+                          <a:schemeClr val="tx1"/>
+                        </a:solidFill>
+                        <a:latin typeface="Cambria Math" panose="02040503050406030204" pitchFamily="18" charset="0"/>
+                        <a:ea typeface="Cambria Math" panose="02040503050406030204" pitchFamily="18" charset="0"/>
+                      </a:rPr>
+                      <m:t>𝜽</m:t>
+                    </m:r>
+                    <m:r>
+                      <a:rPr lang="en-US" sz="5000" b="1" i="1" smtClean="0">
                         <a:solidFill>
                           <a:schemeClr val="tx1"/>
                         </a:solidFill>
@@ -8247,20 +8186,10 @@
                       </a:rPr>
                       <m:t>=</m:t>
                     </m:r>
-                    <m:r>
-                      <a:rPr lang="en-US" sz="4000" b="1" i="1" smtClean="0">
-                        <a:solidFill>
-                          <a:srgbClr val="0070C0"/>
-                        </a:solidFill>
-                        <a:latin typeface="Cambria Math" panose="02040503050406030204" pitchFamily="18" charset="0"/>
-                        <a:ea typeface="Cambria Math" panose="02040503050406030204" pitchFamily="18" charset="0"/>
-                      </a:rPr>
-                      <m:t>𝒎</m:t>
-                    </m:r>
-                    <m:d>
-                      <m:dPr>
+                    <m:sSup>
+                      <m:sSupPr>
                         <m:ctrlPr>
-                          <a:rPr lang="en-US" sz="4000" b="1" i="1" smtClean="0">
+                          <a:rPr lang="en-US" sz="5000" b="1" i="1" smtClean="0">
                             <a:solidFill>
                               <a:schemeClr val="tx1"/>
                             </a:solidFill>
@@ -8268,45 +8197,47 @@
                             <a:ea typeface="Cambria Math" panose="02040503050406030204" pitchFamily="18" charset="0"/>
                           </a:rPr>
                         </m:ctrlPr>
-                      </m:dPr>
+                      </m:sSupPr>
                       <m:e>
                         <m:r>
-                          <a:rPr lang="en-US" sz="4000" b="1" i="1" smtClean="0">
+                          <a:rPr lang="en-US" sz="5000" b="1" i="1" smtClean="0">
                             <a:solidFill>
-                              <a:srgbClr val="FF0000"/>
+                              <a:schemeClr val="tx1"/>
                             </a:solidFill>
                             <a:latin typeface="Cambria Math" panose="02040503050406030204" pitchFamily="18" charset="0"/>
                             <a:ea typeface="Cambria Math" panose="02040503050406030204" pitchFamily="18" charset="0"/>
                           </a:rPr>
-                          <m:t>𝒙</m:t>
+                          <m:t>𝑿</m:t>
                         </m:r>
                       </m:e>
-                    </m:d>
+                      <m:sup>
+                        <m:r>
+                          <a:rPr lang="en-US" sz="5000" b="1" i="1" smtClean="0">
+                            <a:solidFill>
+                              <a:schemeClr val="tx1"/>
+                            </a:solidFill>
+                            <a:latin typeface="Cambria Math" panose="02040503050406030204" pitchFamily="18" charset="0"/>
+                            <a:ea typeface="Cambria Math" panose="02040503050406030204" pitchFamily="18" charset="0"/>
+                          </a:rPr>
+                          <m:t>𝑻</m:t>
+                        </m:r>
+                      </m:sup>
+                    </m:sSup>
                     <m:r>
-                      <a:rPr lang="en-US" sz="4000" b="1" i="1" smtClean="0">
+                      <a:rPr lang="en-US" sz="5000" b="1" i="1" smtClean="0">
                         <a:solidFill>
-                          <a:schemeClr val="tx1"/>
+                          <a:srgbClr val="00B050"/>
                         </a:solidFill>
                         <a:latin typeface="Cambria Math" panose="02040503050406030204" pitchFamily="18" charset="0"/>
                         <a:ea typeface="Cambria Math" panose="02040503050406030204" pitchFamily="18" charset="0"/>
                       </a:rPr>
-                      <m:t>+</m:t>
-                    </m:r>
-                    <m:r>
-                      <a:rPr lang="en-US" sz="4000" b="1" i="1" smtClean="0">
-                        <a:solidFill>
-                          <a:srgbClr val="FFC000"/>
-                        </a:solidFill>
-                        <a:latin typeface="Cambria Math" panose="02040503050406030204" pitchFamily="18" charset="0"/>
-                        <a:ea typeface="Cambria Math" panose="02040503050406030204" pitchFamily="18" charset="0"/>
-                      </a:rPr>
-                      <m:t>𝒃</m:t>
+                      <m:t>𝒚</m:t>
                     </m:r>
                   </m:oMath>
                 </a14:m>
-                <a:endParaRPr lang="en-PH" sz="4000" b="1" dirty="0">
+                <a:endParaRPr lang="en-PH" sz="5000" dirty="0">
                   <a:solidFill>
-                    <a:srgbClr val="0070C0"/>
+                    <a:schemeClr val="tx1"/>
                   </a:solidFill>
                   <a:latin typeface="Cambria Math" panose="02040503050406030204" pitchFamily="18" charset="0"/>
                   <a:ea typeface="Cambria Math" panose="02040503050406030204" pitchFamily="18" charset="0"/>
@@ -8318,10 +8249,10 @@
         <mc:Fallback>
           <p:sp>
             <p:nvSpPr>
-              <p:cNvPr id="5" name="TextBox 4">
+              <p:cNvPr id="9" name="TextBox 8">
                 <a:extLst>
                   <a:ext uri="{FF2B5EF4-FFF2-40B4-BE49-F238E27FC236}">
-                    <a16:creationId xmlns:a16="http://schemas.microsoft.com/office/drawing/2014/main" id="{18CE3913-4106-AC3B-D7D0-EB881D56C0C4}"/>
+                    <a16:creationId xmlns:a16="http://schemas.microsoft.com/office/drawing/2014/main" id="{E075BBE6-0DC4-9B95-5325-B9D414C92E54}"/>
                   </a:ext>
                 </a:extLst>
               </p:cNvPr>
@@ -8332,8 +8263,8 @@
             </p:nvSpPr>
             <p:spPr>
               <a:xfrm>
-                <a:off x="6096000" y="1329115"/>
-                <a:ext cx="3280864" cy="707886"/>
+                <a:off x="5992320" y="2160743"/>
+                <a:ext cx="3963811" cy="875496"/>
               </a:xfrm>
               <a:prstGeom prst="rect">
                 <a:avLst/>
@@ -8341,7 +8272,7 @@
               <a:blipFill>
                 <a:blip r:embed="rId6"/>
                 <a:stretch>
-                  <a:fillRect l="-6506" t="-14655" b="-37069"/>
+                  <a:fillRect r="-1597" b="-16901"/>
                 </a:stretch>
               </a:blipFill>
             </p:spPr>
@@ -8350,7 +8281,7 @@
               <a:lstStyle/>
               <a:p>
                 <a:r>
-                  <a:rPr lang="en-PH">
+                  <a:rPr lang="en-US">
                     <a:noFill/>
                   </a:rPr>
                   <a:t> </a:t>
@@ -8373,7 +8304,7 @@
 </p:sld>
 </file>
 
-<file path=ppt/slides/slide8.xml><?xml version="1.0" encoding="utf-8"?>
+<file path=ppt/slides/slide7.xml><?xml version="1.0" encoding="utf-8"?>
 <p:sld xmlns:a="http://schemas.openxmlformats.org/drawingml/2006/main" xmlns:r="http://schemas.openxmlformats.org/officeDocument/2006/relationships" xmlns:p="http://schemas.openxmlformats.org/presentationml/2006/main">
   <p:cSld>
     <p:bg>
@@ -8451,8 +8382,8 @@
           </a:p>
         </p:txBody>
       </p:sp>
-      <mc:AlternateContent xmlns:mc="http://schemas.openxmlformats.org/markup-compatibility/2006">
-        <mc:Choice xmlns:a14="http://schemas.microsoft.com/office/drawing/2010/main" Requires="a14">
+      <mc:AlternateContent xmlns:mc="http://schemas.openxmlformats.org/markup-compatibility/2006" xmlns:a14="http://schemas.microsoft.com/office/drawing/2010/main">
+        <mc:Choice Requires="a14">
           <p:sp>
             <p:nvSpPr>
               <p:cNvPr id="2" name="Title 1">
@@ -8481,6 +8412,7 @@
               </a:bodyPr>
               <a:lstStyle/>
               <a:p>
+                <a:pPr/>
                 <a14:m>
                   <m:oMathPara xmlns:m="http://schemas.openxmlformats.org/officeDocument/2006/math">
                     <m:oMathParaPr>
@@ -8540,7 +8472,7 @@
             </p:txBody>
           </p:sp>
         </mc:Choice>
-        <mc:Fallback>
+        <mc:Fallback xmlns="">
           <p:sp>
             <p:nvSpPr>
               <p:cNvPr id="2" name="Title 1">
@@ -8802,6 +8734,9 @@
                           <m:e>
                             <m:r>
                               <a:rPr lang="en-US" sz="4000" b="0" i="1" smtClean="0">
+                                <a:solidFill>
+                                  <a:srgbClr val="FFC000"/>
+                                </a:solidFill>
                                 <a:latin typeface="Cambria Math" panose="02040503050406030204" pitchFamily="18" charset="0"/>
                                 <a:ea typeface="Cambria Math" panose="02040503050406030204" pitchFamily="18" charset="0"/>
                               </a:rPr>
@@ -8811,6 +8746,9 @@
                           <m:e>
                             <m:r>
                               <a:rPr lang="en-US" sz="4000" b="0" i="1" smtClean="0">
+                                <a:solidFill>
+                                  <a:srgbClr val="00B0F0"/>
+                                </a:solidFill>
                                 <a:latin typeface="Cambria Math" panose="02040503050406030204" pitchFamily="18" charset="0"/>
                                 <a:ea typeface="Cambria Math" panose="02040503050406030204" pitchFamily="18" charset="0"/>
                               </a:rPr>
@@ -8859,7 +8797,7 @@
               <a:blipFill>
                 <a:blip r:embed="rId5"/>
                 <a:stretch>
-                  <a:fillRect/>
+                  <a:fillRect t="-6202" b="-21705"/>
                 </a:stretch>
               </a:blipFill>
             </p:spPr>
@@ -8868,7 +8806,7 @@
               <a:lstStyle/>
               <a:p>
                 <a:r>
-                  <a:rPr lang="en-PH">
+                  <a:rPr lang="en-US">
                     <a:noFill/>
                   </a:rPr>
                   <a:t> </a:t>
@@ -9087,6 +9025,9 @@
                           <m:e>
                             <m:r>
                               <a:rPr lang="en-US" sz="4000" b="0" i="1" smtClean="0">
+                                <a:solidFill>
+                                  <a:srgbClr val="FFC000"/>
+                                </a:solidFill>
                                 <a:latin typeface="Cambria Math" panose="02040503050406030204" pitchFamily="18" charset="0"/>
                                 <a:ea typeface="Cambria Math" panose="02040503050406030204" pitchFamily="18" charset="0"/>
                               </a:rPr>
@@ -9096,6 +9037,9 @@
                           <m:e>
                             <m:r>
                               <a:rPr lang="en-US" sz="4000" b="0" i="1" smtClean="0">
+                                <a:solidFill>
+                                  <a:srgbClr val="00B0F0"/>
+                                </a:solidFill>
                                 <a:latin typeface="Cambria Math" panose="02040503050406030204" pitchFamily="18" charset="0"/>
                                 <a:ea typeface="Cambria Math" panose="02040503050406030204" pitchFamily="18" charset="0"/>
                               </a:rPr>
@@ -9255,7 +9199,7 @@
               <a:blipFill>
                 <a:blip r:embed="rId6"/>
                 <a:stretch>
-                  <a:fillRect/>
+                  <a:fillRect t="-6977" b="-21705"/>
                 </a:stretch>
               </a:blipFill>
             </p:spPr>
@@ -9264,7 +9208,7 @@
               <a:lstStyle/>
               <a:p>
                 <a:r>
-                  <a:rPr lang="en-PH">
+                  <a:rPr lang="en-US">
                     <a:noFill/>
                   </a:rPr>
                   <a:t> </a:t>
@@ -9287,7 +9231,7 @@
 </p:sld>
 </file>
 
-<file path=ppt/slides/slide9.xml><?xml version="1.0" encoding="utf-8"?>
+<file path=ppt/slides/slide8.xml><?xml version="1.0" encoding="utf-8"?>
 <p:sld xmlns:a="http://schemas.openxmlformats.org/drawingml/2006/main" xmlns:r="http://schemas.openxmlformats.org/officeDocument/2006/relationships" xmlns:p="http://schemas.openxmlformats.org/presentationml/2006/main">
   <p:cSld>
     <p:bg>
@@ -9365,8 +9309,8 @@
           </a:p>
         </p:txBody>
       </p:sp>
-      <mc:AlternateContent xmlns:mc="http://schemas.openxmlformats.org/markup-compatibility/2006">
-        <mc:Choice xmlns:a14="http://schemas.microsoft.com/office/drawing/2010/main" Requires="a14">
+      <mc:AlternateContent xmlns:mc="http://schemas.openxmlformats.org/markup-compatibility/2006" xmlns:a14="http://schemas.microsoft.com/office/drawing/2010/main">
+        <mc:Choice Requires="a14">
           <p:sp>
             <p:nvSpPr>
               <p:cNvPr id="2" name="Title 1">
@@ -9395,6 +9339,7 @@
               </a:bodyPr>
               <a:lstStyle/>
               <a:p>
+                <a:pPr/>
                 <a14:m>
                   <m:oMathPara xmlns:m="http://schemas.openxmlformats.org/officeDocument/2006/math">
                     <m:oMathParaPr>
@@ -9454,7 +9399,7 @@
             </p:txBody>
           </p:sp>
         </mc:Choice>
-        <mc:Fallback>
+        <mc:Fallback xmlns="">
           <p:sp>
             <p:nvSpPr>
               <p:cNvPr id="2" name="Title 1">
@@ -9707,6 +9652,9 @@
                           <m:e>
                             <m:r>
                               <a:rPr lang="en-US" sz="4000" b="0" i="1" smtClean="0">
+                                <a:solidFill>
+                                  <a:srgbClr val="FFC000"/>
+                                </a:solidFill>
                                 <a:latin typeface="Cambria Math" panose="02040503050406030204" pitchFamily="18" charset="0"/>
                                 <a:ea typeface="Cambria Math" panose="02040503050406030204" pitchFamily="18" charset="0"/>
                               </a:rPr>
@@ -9716,6 +9664,9 @@
                           <m:e>
                             <m:r>
                               <a:rPr lang="en-US" sz="4000" b="0" i="1" smtClean="0">
+                                <a:solidFill>
+                                  <a:srgbClr val="00B0F0"/>
+                                </a:solidFill>
                                 <a:latin typeface="Cambria Math" panose="02040503050406030204" pitchFamily="18" charset="0"/>
                                 <a:ea typeface="Cambria Math" panose="02040503050406030204" pitchFamily="18" charset="0"/>
                               </a:rPr>
@@ -9875,7 +9826,7 @@
               <a:blipFill>
                 <a:blip r:embed="rId5"/>
                 <a:stretch>
-                  <a:fillRect/>
+                  <a:fillRect t="-6202" b="-21705"/>
                 </a:stretch>
               </a:blipFill>
             </p:spPr>
@@ -9884,7 +9835,7 @@
               <a:lstStyle/>
               <a:p>
                 <a:r>
-                  <a:rPr lang="en-PH">
+                  <a:rPr lang="en-US">
                     <a:noFill/>
                   </a:rPr>
                   <a:t> </a:t>
@@ -9910,7 +9861,7 @@
             </p:nvSpPr>
             <p:spPr>
               <a:xfrm>
-                <a:off x="4005268" y="3800508"/>
+                <a:off x="4016026" y="3800508"/>
                 <a:ext cx="4446157" cy="1038682"/>
               </a:xfrm>
               <a:prstGeom prst="rect">
@@ -9999,6 +9950,9 @@
                           <m:e>
                             <m:r>
                               <a:rPr lang="en-US" sz="4000" b="0" i="1" smtClean="0">
+                                <a:solidFill>
+                                  <a:srgbClr val="FFC000"/>
+                                </a:solidFill>
                                 <a:latin typeface="Cambria Math" panose="02040503050406030204" pitchFamily="18" charset="0"/>
                                 <a:ea typeface="Cambria Math" panose="02040503050406030204" pitchFamily="18" charset="0"/>
                               </a:rPr>
@@ -10008,6 +9962,9 @@
                           <m:e>
                             <m:r>
                               <a:rPr lang="en-US" sz="4000" b="0" i="1" smtClean="0">
+                                <a:solidFill>
+                                  <a:srgbClr val="00B0F0"/>
+                                </a:solidFill>
                                 <a:latin typeface="Cambria Math" panose="02040503050406030204" pitchFamily="18" charset="0"/>
                                 <a:ea typeface="Cambria Math" panose="02040503050406030204" pitchFamily="18" charset="0"/>
                               </a:rPr>
@@ -10098,7 +10055,7 @@
             </p:nvSpPr>
             <p:spPr>
               <a:xfrm>
-                <a:off x="4005268" y="3800508"/>
+                <a:off x="4016026" y="3800508"/>
                 <a:ext cx="4446157" cy="1038682"/>
               </a:xfrm>
               <a:prstGeom prst="rect">
@@ -10107,7 +10064,232 @@
               <a:blipFill>
                 <a:blip r:embed="rId6"/>
                 <a:stretch>
-                  <a:fillRect b="-7602"/>
+                  <a:fillRect t="-9639" b="-32530"/>
+                </a:stretch>
+              </a:blipFill>
+            </p:spPr>
+            <p:txBody>
+              <a:bodyPr/>
+              <a:lstStyle/>
+              <a:p>
+                <a:r>
+                  <a:rPr lang="en-US">
+                    <a:noFill/>
+                  </a:rPr>
+                  <a:t> </a:t>
+                </a:r>
+              </a:p>
+            </p:txBody>
+          </p:sp>
+        </mc:Fallback>
+      </mc:AlternateContent>
+    </p:spTree>
+    <p:extLst>
+      <p:ext uri="{BB962C8B-B14F-4D97-AF65-F5344CB8AC3E}">
+        <p14:creationId xmlns:p14="http://schemas.microsoft.com/office/powerpoint/2010/main" val="2952946064"/>
+      </p:ext>
+    </p:extLst>
+  </p:cSld>
+  <p:clrMapOvr>
+    <a:masterClrMapping/>
+  </p:clrMapOvr>
+</p:sld>
+</file>
+
+<file path=ppt/slides/slide9.xml><?xml version="1.0" encoding="utf-8"?>
+<p:sld xmlns:a="http://schemas.openxmlformats.org/drawingml/2006/main" xmlns:r="http://schemas.openxmlformats.org/officeDocument/2006/relationships" xmlns:p="http://schemas.openxmlformats.org/presentationml/2006/main">
+  <p:cSld>
+    <p:bg>
+      <p:bgPr>
+        <a:blipFill dpi="0" rotWithShape="1">
+          <a:blip r:embed="rId3">
+            <a:alphaModFix amt="99000"/>
+            <a:lum/>
+          </a:blip>
+          <a:srcRect/>
+          <a:stretch>
+            <a:fillRect t="89000" r="85000" b="-1000"/>
+          </a:stretch>
+        </a:blipFill>
+        <a:effectLst/>
+      </p:bgPr>
+    </p:bg>
+    <p:spTree>
+      <p:nvGrpSpPr>
+        <p:cNvPr id="1" name=""/>
+        <p:cNvGrpSpPr/>
+        <p:nvPr/>
+      </p:nvGrpSpPr>
+      <p:grpSpPr>
+        <a:xfrm>
+          <a:off x="0" y="0"/>
+          <a:ext cx="0" cy="0"/>
+          <a:chOff x="0" y="0"/>
+          <a:chExt cx="0" cy="0"/>
+        </a:xfrm>
+      </p:grpSpPr>
+      <p:sp>
+        <p:nvSpPr>
+          <p:cNvPr id="4" name="Footer Placeholder 3">
+            <a:extLst>
+              <a:ext uri="{FF2B5EF4-FFF2-40B4-BE49-F238E27FC236}">
+                <a16:creationId xmlns:a16="http://schemas.microsoft.com/office/drawing/2014/main" id="{638E7DE1-45EE-476A-A474-0F3C264AEDA3}"/>
+              </a:ext>
+            </a:extLst>
+          </p:cNvPr>
+          <p:cNvSpPr>
+            <a:spLocks noGrp="1"/>
+          </p:cNvSpPr>
+          <p:nvPr>
+            <p:ph type="ftr" sz="quarter" idx="11"/>
+          </p:nvPr>
+        </p:nvSpPr>
+        <p:spPr>
+          <a:xfrm>
+            <a:off x="0" y="6139541"/>
+            <a:ext cx="12192000" cy="718459"/>
+          </a:xfrm>
+          <a:ln w="28575">
+            <a:solidFill>
+              <a:schemeClr val="accent5">
+                <a:lumMod val="50000"/>
+              </a:schemeClr>
+            </a:solidFill>
+          </a:ln>
+        </p:spPr>
+        <p:txBody>
+          <a:bodyPr/>
+          <a:lstStyle/>
+          <a:p>
+            <a:pPr algn="r"/>
+            <a:r>
+              <a:rPr lang="en-US" b="1" dirty="0">
+                <a:solidFill>
+                  <a:schemeClr val="tx1"/>
+                </a:solidFill>
+              </a:rPr>
+              <a:t>CCINSYSL</a:t>
+            </a:r>
+            <a:endParaRPr lang="en-PH" dirty="0"/>
+          </a:p>
+        </p:txBody>
+      </p:sp>
+      <mc:AlternateContent xmlns:mc="http://schemas.openxmlformats.org/markup-compatibility/2006" xmlns:a14="http://schemas.microsoft.com/office/drawing/2010/main">
+        <mc:Choice Requires="a14">
+          <p:sp>
+            <p:nvSpPr>
+              <p:cNvPr id="2" name="Title 1">
+                <a:extLst>
+                  <a:ext uri="{FF2B5EF4-FFF2-40B4-BE49-F238E27FC236}">
+                    <a16:creationId xmlns:a16="http://schemas.microsoft.com/office/drawing/2014/main" id="{E8FE4DC5-50CE-9CEE-1720-B3DB36475851}"/>
+                  </a:ext>
+                </a:extLst>
+              </p:cNvPr>
+              <p:cNvSpPr>
+                <a:spLocks noGrp="1"/>
+              </p:cNvSpPr>
+              <p:nvPr>
+                <p:ph type="ctrTitle"/>
+              </p:nvPr>
+            </p:nvSpPr>
+            <p:spPr>
+              <a:xfrm>
+                <a:off x="723900" y="482336"/>
+                <a:ext cx="11008894" cy="565154"/>
+              </a:xfrm>
+            </p:spPr>
+            <p:txBody>
+              <a:bodyPr>
+                <a:noAutofit/>
+              </a:bodyPr>
+              <a:lstStyle/>
+              <a:p>
+                <a:pPr/>
+                <a14:m>
+                  <m:oMathPara xmlns:m="http://schemas.openxmlformats.org/officeDocument/2006/math">
+                    <m:oMathParaPr>
+                      <m:jc m:val="centerGroup"/>
+                    </m:oMathParaPr>
+                    <m:oMath xmlns:m="http://schemas.openxmlformats.org/officeDocument/2006/math">
+                      <m:r>
+                        <m:rPr>
+                          <m:nor/>
+                        </m:rPr>
+                        <a:rPr lang="en-US" sz="5400" b="1" dirty="0" smtClean="0">
+                          <a:latin typeface="Calibri Light (Headings)"/>
+                        </a:rPr>
+                        <m:t>The</m:t>
+                      </m:r>
+                      <m:r>
+                        <m:rPr>
+                          <m:nor/>
+                        </m:rPr>
+                        <a:rPr lang="en-US" sz="5400" b="1" dirty="0" smtClean="0">
+                          <a:latin typeface="Calibri Light (Headings)"/>
+                        </a:rPr>
+                        <m:t> </m:t>
+                      </m:r>
+                      <m:r>
+                        <m:rPr>
+                          <m:nor/>
+                        </m:rPr>
+                        <a:rPr lang="en-US" sz="5400" b="1" dirty="0" smtClean="0">
+                          <a:latin typeface="Calibri Light (Headings)"/>
+                        </a:rPr>
+                        <m:t>Normal</m:t>
+                      </m:r>
+                      <m:r>
+                        <m:rPr>
+                          <m:nor/>
+                        </m:rPr>
+                        <a:rPr lang="en-US" sz="5400" b="1" dirty="0" smtClean="0">
+                          <a:latin typeface="Calibri Light (Headings)"/>
+                        </a:rPr>
+                        <m:t> </m:t>
+                      </m:r>
+                      <m:r>
+                        <m:rPr>
+                          <m:nor/>
+                        </m:rPr>
+                        <a:rPr lang="en-US" sz="5400" b="1" dirty="0" smtClean="0">
+                          <a:latin typeface="Calibri Light (Headings)"/>
+                        </a:rPr>
+                        <m:t>Equation</m:t>
+                      </m:r>
+                    </m:oMath>
+                  </m:oMathPara>
+                </a14:m>
+                <a:endParaRPr lang="en-PH" sz="5000" b="1" dirty="0"/>
+              </a:p>
+            </p:txBody>
+          </p:sp>
+        </mc:Choice>
+        <mc:Fallback xmlns="">
+          <p:sp>
+            <p:nvSpPr>
+              <p:cNvPr id="2" name="Title 1">
+                <a:extLst>
+                  <a:ext uri="{FF2B5EF4-FFF2-40B4-BE49-F238E27FC236}">
+                    <a16:creationId xmlns:a16="http://schemas.microsoft.com/office/drawing/2014/main" id="{E8FE4DC5-50CE-9CEE-1720-B3DB36475851}"/>
+                  </a:ext>
+                </a:extLst>
+              </p:cNvPr>
+              <p:cNvSpPr>
+                <a:spLocks noGrp="1" noRot="1" noChangeAspect="1" noMove="1" noResize="1" noEditPoints="1" noAdjustHandles="1" noChangeArrowheads="1" noChangeShapeType="1" noTextEdit="1"/>
+              </p:cNvSpPr>
+              <p:nvPr>
+                <p:ph type="ctrTitle"/>
+              </p:nvPr>
+            </p:nvSpPr>
+            <p:spPr>
+              <a:xfrm>
+                <a:off x="723900" y="482336"/>
+                <a:ext cx="11008894" cy="565154"/>
+              </a:xfrm>
+              <a:blipFill>
+                <a:blip r:embed="rId4"/>
+                <a:stretch>
+                  <a:fillRect t="-23656"/>
                 </a:stretch>
               </a:blipFill>
             </p:spPr>
@@ -10126,10 +10308,522 @@
           </p:sp>
         </mc:Fallback>
       </mc:AlternateContent>
+      <mc:AlternateContent xmlns:mc="http://schemas.openxmlformats.org/markup-compatibility/2006">
+        <mc:Choice xmlns:a14="http://schemas.microsoft.com/office/drawing/2010/main" Requires="a14">
+          <p:sp>
+            <p:nvSpPr>
+              <p:cNvPr id="5" name="TextBox 4">
+                <a:extLst>
+                  <a:ext uri="{FF2B5EF4-FFF2-40B4-BE49-F238E27FC236}">
+                    <a16:creationId xmlns:a16="http://schemas.microsoft.com/office/drawing/2014/main" id="{5425116C-B2BD-8502-39BE-A30CF797E250}"/>
+                  </a:ext>
+                </a:extLst>
+              </p:cNvPr>
+              <p:cNvSpPr txBox="1"/>
+              <p:nvPr/>
+            </p:nvSpPr>
+            <p:spPr>
+              <a:xfrm>
+                <a:off x="3872921" y="1537368"/>
+                <a:ext cx="4446157" cy="1038682"/>
+              </a:xfrm>
+              <a:prstGeom prst="rect">
+                <a:avLst/>
+              </a:prstGeom>
+              <a:noFill/>
+            </p:spPr>
+            <p:txBody>
+              <a:bodyPr wrap="square" lIns="0" tIns="0" rIns="0" bIns="0" rtlCol="0">
+                <a:spAutoFit/>
+              </a:bodyPr>
+              <a:lstStyle/>
+              <a:p>
+                <a14:m>
+                  <m:oMath xmlns:m="http://schemas.openxmlformats.org/officeDocument/2006/math">
+                    <m:d>
+                      <m:dPr>
+                        <m:ctrlPr>
+                          <a:rPr lang="en-PH" sz="4000" i="1" smtClean="0">
+                            <a:latin typeface="Cambria Math" panose="02040503050406030204" pitchFamily="18" charset="0"/>
+                            <a:ea typeface="Cambria Math" panose="02040503050406030204" pitchFamily="18" charset="0"/>
+                          </a:rPr>
+                        </m:ctrlPr>
+                      </m:dPr>
+                      <m:e>
+                        <m:eqArr>
+                          <m:eqArrPr>
+                            <m:ctrlPr>
+                              <a:rPr lang="en-US" sz="4000" b="0" i="1" smtClean="0">
+                                <a:latin typeface="Cambria Math" panose="02040503050406030204" pitchFamily="18" charset="0"/>
+                                <a:ea typeface="Cambria Math" panose="02040503050406030204" pitchFamily="18" charset="0"/>
+                              </a:rPr>
+                            </m:ctrlPr>
+                          </m:eqArrPr>
+                          <m:e>
+                            <m:r>
+                              <a:rPr lang="en-US" sz="4000" b="0" i="1" smtClean="0">
+                                <a:latin typeface="Cambria Math" panose="02040503050406030204" pitchFamily="18" charset="0"/>
+                                <a:ea typeface="Cambria Math" panose="02040503050406030204" pitchFamily="18" charset="0"/>
+                              </a:rPr>
+                              <m:t>3    6</m:t>
+                            </m:r>
+                          </m:e>
+                          <m:e>
+                            <m:r>
+                              <a:rPr lang="en-US" sz="4000" b="0" i="1" smtClean="0">
+                                <a:latin typeface="Cambria Math" panose="02040503050406030204" pitchFamily="18" charset="0"/>
+                                <a:ea typeface="Cambria Math" panose="02040503050406030204" pitchFamily="18" charset="0"/>
+                              </a:rPr>
+                              <m:t>6  14</m:t>
+                            </m:r>
+                          </m:e>
+                        </m:eqArr>
+                      </m:e>
+                    </m:d>
+                  </m:oMath>
+                </a14:m>
+                <a:r>
+                  <a:rPr lang="en-PH" sz="4000" dirty="0">
+                    <a:latin typeface="Cambria Math" panose="02040503050406030204" pitchFamily="18" charset="0"/>
+                    <a:ea typeface="Cambria Math" panose="02040503050406030204" pitchFamily="18" charset="0"/>
+                  </a:rPr>
+                  <a:t> </a:t>
+                </a:r>
+                <a14:m>
+                  <m:oMath xmlns:m="http://schemas.openxmlformats.org/officeDocument/2006/math">
+                    <m:d>
+                      <m:dPr>
+                        <m:ctrlPr>
+                          <a:rPr lang="en-PH" sz="4000" i="1">
+                            <a:latin typeface="Cambria Math" panose="02040503050406030204" pitchFamily="18" charset="0"/>
+                            <a:ea typeface="Cambria Math" panose="02040503050406030204" pitchFamily="18" charset="0"/>
+                          </a:rPr>
+                        </m:ctrlPr>
+                      </m:dPr>
+                      <m:e>
+                        <m:eqArr>
+                          <m:eqArrPr>
+                            <m:ctrlPr>
+                              <a:rPr lang="en-US" sz="4000" i="1">
+                                <a:latin typeface="Cambria Math" panose="02040503050406030204" pitchFamily="18" charset="0"/>
+                                <a:ea typeface="Cambria Math" panose="02040503050406030204" pitchFamily="18" charset="0"/>
+                              </a:rPr>
+                            </m:ctrlPr>
+                          </m:eqArrPr>
+                          <m:e>
+                            <m:r>
+                              <a:rPr lang="en-US" sz="4000" b="0" i="1" smtClean="0">
+                                <a:solidFill>
+                                  <a:srgbClr val="FFC000"/>
+                                </a:solidFill>
+                                <a:latin typeface="Cambria Math" panose="02040503050406030204" pitchFamily="18" charset="0"/>
+                                <a:ea typeface="Cambria Math" panose="02040503050406030204" pitchFamily="18" charset="0"/>
+                              </a:rPr>
+                              <m:t>𝑏</m:t>
+                            </m:r>
+                          </m:e>
+                          <m:e>
+                            <m:r>
+                              <a:rPr lang="en-US" sz="4000" b="0" i="1" smtClean="0">
+                                <a:solidFill>
+                                  <a:srgbClr val="00B0F0"/>
+                                </a:solidFill>
+                                <a:latin typeface="Cambria Math" panose="02040503050406030204" pitchFamily="18" charset="0"/>
+                                <a:ea typeface="Cambria Math" panose="02040503050406030204" pitchFamily="18" charset="0"/>
+                              </a:rPr>
+                              <m:t>𝑚</m:t>
+                            </m:r>
+                          </m:e>
+                        </m:eqArr>
+                      </m:e>
+                    </m:d>
+                  </m:oMath>
+                </a14:m>
+                <a:r>
+                  <a:rPr lang="en-PH" sz="4000" dirty="0">
+                    <a:latin typeface="Cambria Math" panose="02040503050406030204" pitchFamily="18" charset="0"/>
+                    <a:ea typeface="Cambria Math" panose="02040503050406030204" pitchFamily="18" charset="0"/>
+                  </a:rPr>
+                  <a:t> = </a:t>
+                </a:r>
+                <a14:m>
+                  <m:oMath xmlns:m="http://schemas.openxmlformats.org/officeDocument/2006/math">
+                    <m:d>
+                      <m:dPr>
+                        <m:ctrlPr>
+                          <a:rPr lang="en-PH" sz="4000" i="1">
+                            <a:latin typeface="Cambria Math" panose="02040503050406030204" pitchFamily="18" charset="0"/>
+                            <a:ea typeface="Cambria Math" panose="02040503050406030204" pitchFamily="18" charset="0"/>
+                          </a:rPr>
+                        </m:ctrlPr>
+                      </m:dPr>
+                      <m:e>
+                        <m:eqArr>
+                          <m:eqArrPr>
+                            <m:ctrlPr>
+                              <a:rPr lang="en-US" sz="4000" b="0" i="1" smtClean="0">
+                                <a:latin typeface="Cambria Math" panose="02040503050406030204" pitchFamily="18" charset="0"/>
+                                <a:ea typeface="Cambria Math" panose="02040503050406030204" pitchFamily="18" charset="0"/>
+                              </a:rPr>
+                            </m:ctrlPr>
+                          </m:eqArrPr>
+                          <m:e>
+                            <m:r>
+                              <a:rPr lang="en-US" sz="4000" b="0" i="1" smtClean="0">
+                                <a:latin typeface="Cambria Math" panose="02040503050406030204" pitchFamily="18" charset="0"/>
+                                <a:ea typeface="Cambria Math" panose="02040503050406030204" pitchFamily="18" charset="0"/>
+                              </a:rPr>
+                              <m:t>6</m:t>
+                            </m:r>
+                          </m:e>
+                          <m:e>
+                            <m:r>
+                              <a:rPr lang="en-US" sz="4000" b="0" i="1" smtClean="0">
+                                <a:latin typeface="Cambria Math" panose="02040503050406030204" pitchFamily="18" charset="0"/>
+                                <a:ea typeface="Cambria Math" panose="02040503050406030204" pitchFamily="18" charset="0"/>
+                              </a:rPr>
+                              <m:t>13</m:t>
+                            </m:r>
+                          </m:e>
+                        </m:eqArr>
+                      </m:e>
+                    </m:d>
+                  </m:oMath>
+                </a14:m>
+                <a:r>
+                  <a:rPr lang="en-PH" sz="4000" dirty="0">
+                    <a:latin typeface="Cambria Math" panose="02040503050406030204" pitchFamily="18" charset="0"/>
+                    <a:ea typeface="Cambria Math" panose="02040503050406030204" pitchFamily="18" charset="0"/>
+                  </a:rPr>
+                  <a:t> </a:t>
+                </a:r>
+              </a:p>
+            </p:txBody>
+          </p:sp>
+        </mc:Choice>
+        <mc:Fallback>
+          <p:sp>
+            <p:nvSpPr>
+              <p:cNvPr id="5" name="TextBox 4">
+                <a:extLst>
+                  <a:ext uri="{FF2B5EF4-FFF2-40B4-BE49-F238E27FC236}">
+                    <a16:creationId xmlns:a16="http://schemas.microsoft.com/office/drawing/2014/main" id="{5425116C-B2BD-8502-39BE-A30CF797E250}"/>
+                  </a:ext>
+                </a:extLst>
+              </p:cNvPr>
+              <p:cNvSpPr txBox="1">
+                <a:spLocks noRot="1" noChangeAspect="1" noMove="1" noResize="1" noEditPoints="1" noAdjustHandles="1" noChangeArrowheads="1" noChangeShapeType="1" noTextEdit="1"/>
+              </p:cNvSpPr>
+              <p:nvPr/>
+            </p:nvSpPr>
+            <p:spPr>
+              <a:xfrm>
+                <a:off x="3872921" y="1537368"/>
+                <a:ext cx="4446157" cy="1038682"/>
+              </a:xfrm>
+              <a:prstGeom prst="rect">
+                <a:avLst/>
+              </a:prstGeom>
+              <a:blipFill>
+                <a:blip r:embed="rId5"/>
+                <a:stretch>
+                  <a:fillRect t="-8333" b="-32143"/>
+                </a:stretch>
+              </a:blipFill>
+            </p:spPr>
+            <p:txBody>
+              <a:bodyPr/>
+              <a:lstStyle/>
+              <a:p>
+                <a:r>
+                  <a:rPr lang="en-US">
+                    <a:noFill/>
+                  </a:rPr>
+                  <a:t> </a:t>
+                </a:r>
+              </a:p>
+            </p:txBody>
+          </p:sp>
+        </mc:Fallback>
+      </mc:AlternateContent>
+      <mc:AlternateContent xmlns:mc="http://schemas.openxmlformats.org/markup-compatibility/2006">
+        <mc:Choice xmlns:a14="http://schemas.microsoft.com/office/drawing/2010/main" Requires="a14">
+          <p:sp>
+            <p:nvSpPr>
+              <p:cNvPr id="7" name="TextBox 6">
+                <a:extLst>
+                  <a:ext uri="{FF2B5EF4-FFF2-40B4-BE49-F238E27FC236}">
+                    <a16:creationId xmlns:a16="http://schemas.microsoft.com/office/drawing/2014/main" id="{405F2F4E-A66F-7A62-C003-0CB2072BE839}"/>
+                  </a:ext>
+                </a:extLst>
+              </p:cNvPr>
+              <p:cNvSpPr txBox="1"/>
+              <p:nvPr/>
+            </p:nvSpPr>
+            <p:spPr>
+              <a:xfrm>
+                <a:off x="2863410" y="3478580"/>
+                <a:ext cx="6465178" cy="879215"/>
+              </a:xfrm>
+              <a:prstGeom prst="rect">
+                <a:avLst/>
+              </a:prstGeom>
+              <a:noFill/>
+            </p:spPr>
+            <p:txBody>
+              <a:bodyPr wrap="square">
+                <a:spAutoFit/>
+              </a:bodyPr>
+              <a:lstStyle/>
+              <a:p>
+                <a14:m>
+                  <m:oMathPara xmlns:m="http://schemas.openxmlformats.org/officeDocument/2006/math">
+                    <m:oMathParaPr>
+                      <m:jc m:val="centerGroup"/>
+                    </m:oMathParaPr>
+                    <m:oMath xmlns:m="http://schemas.openxmlformats.org/officeDocument/2006/math">
+                      <m:r>
+                        <a:rPr lang="en-US" sz="5000" b="1" i="1" smtClean="0">
+                          <a:solidFill>
+                            <a:srgbClr val="00B050"/>
+                          </a:solidFill>
+                          <a:latin typeface="Cambria Math" panose="02040503050406030204" pitchFamily="18" charset="0"/>
+                          <a:ea typeface="Cambria Math" panose="02040503050406030204" pitchFamily="18" charset="0"/>
+                        </a:rPr>
+                        <m:t>𝜽</m:t>
+                      </m:r>
+                      <m:r>
+                        <a:rPr lang="en-US" sz="5000" b="1" i="1" smtClean="0">
+                          <a:solidFill>
+                            <a:schemeClr val="tx1"/>
+                          </a:solidFill>
+                          <a:latin typeface="Cambria Math" panose="02040503050406030204" pitchFamily="18" charset="0"/>
+                          <a:ea typeface="Cambria Math" panose="02040503050406030204" pitchFamily="18" charset="0"/>
+                        </a:rPr>
+                        <m:t>=</m:t>
+                      </m:r>
+                      <m:sSup>
+                        <m:sSupPr>
+                          <m:ctrlPr>
+                            <a:rPr lang="en-US" sz="5000" b="1" i="1" smtClean="0">
+                              <a:solidFill>
+                                <a:schemeClr val="tx1"/>
+                              </a:solidFill>
+                              <a:latin typeface="Cambria Math" panose="02040503050406030204" pitchFamily="18" charset="0"/>
+                              <a:ea typeface="Cambria Math" panose="02040503050406030204" pitchFamily="18" charset="0"/>
+                            </a:rPr>
+                          </m:ctrlPr>
+                        </m:sSupPr>
+                        <m:e>
+                          <m:sSup>
+                            <m:sSupPr>
+                              <m:ctrlPr>
+                                <a:rPr lang="en-US" sz="5000" b="1" i="1" smtClean="0">
+                                  <a:solidFill>
+                                    <a:schemeClr val="tx1"/>
+                                  </a:solidFill>
+                                  <a:latin typeface="Cambria Math" panose="02040503050406030204" pitchFamily="18" charset="0"/>
+                                  <a:ea typeface="Cambria Math" panose="02040503050406030204" pitchFamily="18" charset="0"/>
+                                </a:rPr>
+                              </m:ctrlPr>
+                            </m:sSupPr>
+                            <m:e>
+                              <m:r>
+                                <a:rPr lang="en-US" sz="5000" b="1" i="1" smtClean="0">
+                                  <a:solidFill>
+                                    <a:schemeClr val="tx1"/>
+                                  </a:solidFill>
+                                  <a:latin typeface="Cambria Math" panose="02040503050406030204" pitchFamily="18" charset="0"/>
+                                  <a:ea typeface="Cambria Math" panose="02040503050406030204" pitchFamily="18" charset="0"/>
+                                </a:rPr>
+                                <m:t>(</m:t>
+                              </m:r>
+                              <m:sSup>
+                                <m:sSupPr>
+                                  <m:ctrlPr>
+                                    <a:rPr lang="en-US" sz="5000" b="1" i="1">
+                                      <a:latin typeface="Cambria Math" panose="02040503050406030204" pitchFamily="18" charset="0"/>
+                                      <a:ea typeface="Cambria Math" panose="02040503050406030204" pitchFamily="18" charset="0"/>
+                                    </a:rPr>
+                                  </m:ctrlPr>
+                                </m:sSupPr>
+                                <m:e>
+                                  <m:r>
+                                    <a:rPr lang="en-US" sz="5000" b="1" i="1">
+                                      <a:latin typeface="Cambria Math" panose="02040503050406030204" pitchFamily="18" charset="0"/>
+                                      <a:ea typeface="Cambria Math" panose="02040503050406030204" pitchFamily="18" charset="0"/>
+                                    </a:rPr>
+                                    <m:t>𝑿</m:t>
+                                  </m:r>
+                                </m:e>
+                                <m:sup>
+                                  <m:r>
+                                    <a:rPr lang="en-US" sz="5000" b="1" i="1">
+                                      <a:latin typeface="Cambria Math" panose="02040503050406030204" pitchFamily="18" charset="0"/>
+                                      <a:ea typeface="Cambria Math" panose="02040503050406030204" pitchFamily="18" charset="0"/>
+                                    </a:rPr>
+                                    <m:t>𝑻</m:t>
+                                  </m:r>
+                                </m:sup>
+                              </m:sSup>
+                              <m:r>
+                                <a:rPr lang="en-US" sz="5000" b="1" i="1">
+                                  <a:latin typeface="Cambria Math" panose="02040503050406030204" pitchFamily="18" charset="0"/>
+                                  <a:ea typeface="Cambria Math" panose="02040503050406030204" pitchFamily="18" charset="0"/>
+                                </a:rPr>
+                                <m:t>𝑿</m:t>
+                              </m:r>
+                              <m:r>
+                                <a:rPr lang="en-US" sz="5000" b="1" i="1" smtClean="0">
+                                  <a:solidFill>
+                                    <a:schemeClr val="tx1"/>
+                                  </a:solidFill>
+                                  <a:latin typeface="Cambria Math" panose="02040503050406030204" pitchFamily="18" charset="0"/>
+                                  <a:ea typeface="Cambria Math" panose="02040503050406030204" pitchFamily="18" charset="0"/>
+                                </a:rPr>
+                                <m:t>)</m:t>
+                              </m:r>
+                            </m:e>
+                            <m:sup>
+                              <m:r>
+                                <a:rPr lang="en-US" sz="5000" b="1" i="1" smtClean="0">
+                                  <a:solidFill>
+                                    <a:schemeClr val="tx1"/>
+                                  </a:solidFill>
+                                  <a:latin typeface="Cambria Math" panose="02040503050406030204" pitchFamily="18" charset="0"/>
+                                  <a:ea typeface="Cambria Math" panose="02040503050406030204" pitchFamily="18" charset="0"/>
+                                </a:rPr>
+                                <m:t>−</m:t>
+                              </m:r>
+                              <m:r>
+                                <a:rPr lang="en-US" sz="5000" b="1" i="1" smtClean="0">
+                                  <a:solidFill>
+                                    <a:schemeClr val="tx1"/>
+                                  </a:solidFill>
+                                  <a:latin typeface="Cambria Math" panose="02040503050406030204" pitchFamily="18" charset="0"/>
+                                  <a:ea typeface="Cambria Math" panose="02040503050406030204" pitchFamily="18" charset="0"/>
+                                </a:rPr>
+                                <m:t>𝟏</m:t>
+                              </m:r>
+                            </m:sup>
+                          </m:sSup>
+                          <m:r>
+                            <a:rPr lang="en-US" sz="5000" b="1" i="1" smtClean="0">
+                              <a:solidFill>
+                                <a:schemeClr val="tx1"/>
+                              </a:solidFill>
+                              <a:latin typeface="Cambria Math" panose="02040503050406030204" pitchFamily="18" charset="0"/>
+                              <a:ea typeface="Cambria Math" panose="02040503050406030204" pitchFamily="18" charset="0"/>
+                            </a:rPr>
+                            <m:t>(</m:t>
+                          </m:r>
+                          <m:r>
+                            <a:rPr lang="en-US" sz="5000" b="1" i="1" smtClean="0">
+                              <a:solidFill>
+                                <a:schemeClr val="tx1"/>
+                              </a:solidFill>
+                              <a:latin typeface="Cambria Math" panose="02040503050406030204" pitchFamily="18" charset="0"/>
+                              <a:ea typeface="Cambria Math" panose="02040503050406030204" pitchFamily="18" charset="0"/>
+                            </a:rPr>
+                            <m:t>𝑿</m:t>
+                          </m:r>
+                        </m:e>
+                        <m:sup>
+                          <m:r>
+                            <a:rPr lang="en-US" sz="5000" b="1" i="1" smtClean="0">
+                              <a:solidFill>
+                                <a:schemeClr val="tx1"/>
+                              </a:solidFill>
+                              <a:latin typeface="Cambria Math" panose="02040503050406030204" pitchFamily="18" charset="0"/>
+                              <a:ea typeface="Cambria Math" panose="02040503050406030204" pitchFamily="18" charset="0"/>
+                            </a:rPr>
+                            <m:t>𝑻</m:t>
+                          </m:r>
+                        </m:sup>
+                      </m:sSup>
+                      <m:r>
+                        <a:rPr lang="en-US" sz="5000" b="1" i="1" smtClean="0">
+                          <a:solidFill>
+                            <a:schemeClr val="tx1"/>
+                          </a:solidFill>
+                          <a:latin typeface="Cambria Math" panose="02040503050406030204" pitchFamily="18" charset="0"/>
+                          <a:ea typeface="Cambria Math" panose="02040503050406030204" pitchFamily="18" charset="0"/>
+                        </a:rPr>
+                        <m:t>𝒚</m:t>
+                      </m:r>
+                      <m:r>
+                        <a:rPr lang="en-US" sz="5000" b="1" i="1" smtClean="0">
+                          <a:solidFill>
+                            <a:schemeClr val="tx1"/>
+                          </a:solidFill>
+                          <a:latin typeface="Cambria Math" panose="02040503050406030204" pitchFamily="18" charset="0"/>
+                          <a:ea typeface="Cambria Math" panose="02040503050406030204" pitchFamily="18" charset="0"/>
+                        </a:rPr>
+                        <m:t>)</m:t>
+                      </m:r>
+                    </m:oMath>
+                  </m:oMathPara>
+                </a14:m>
+                <a:endParaRPr lang="en-PH" sz="5000" dirty="0">
+                  <a:solidFill>
+                    <a:schemeClr val="tx1"/>
+                  </a:solidFill>
+                  <a:latin typeface="Cambria Math" panose="02040503050406030204" pitchFamily="18" charset="0"/>
+                  <a:ea typeface="Cambria Math" panose="02040503050406030204" pitchFamily="18" charset="0"/>
+                </a:endParaRPr>
+              </a:p>
+            </p:txBody>
+          </p:sp>
+        </mc:Choice>
+        <mc:Fallback>
+          <p:sp>
+            <p:nvSpPr>
+              <p:cNvPr id="7" name="TextBox 6">
+                <a:extLst>
+                  <a:ext uri="{FF2B5EF4-FFF2-40B4-BE49-F238E27FC236}">
+                    <a16:creationId xmlns:a16="http://schemas.microsoft.com/office/drawing/2014/main" id="{405F2F4E-A66F-7A62-C003-0CB2072BE839}"/>
+                  </a:ext>
+                </a:extLst>
+              </p:cNvPr>
+              <p:cNvSpPr txBox="1">
+                <a:spLocks noRot="1" noChangeAspect="1" noMove="1" noResize="1" noEditPoints="1" noAdjustHandles="1" noChangeArrowheads="1" noChangeShapeType="1" noTextEdit="1"/>
+              </p:cNvSpPr>
+              <p:nvPr/>
+            </p:nvSpPr>
+            <p:spPr>
+              <a:xfrm>
+                <a:off x="2863410" y="3478580"/>
+                <a:ext cx="6465178" cy="879215"/>
+              </a:xfrm>
+              <a:prstGeom prst="rect">
+                <a:avLst/>
+              </a:prstGeom>
+              <a:blipFill>
+                <a:blip r:embed="rId6"/>
+                <a:stretch>
+                  <a:fillRect b="-24286"/>
+                </a:stretch>
+              </a:blipFill>
+            </p:spPr>
+            <p:txBody>
+              <a:bodyPr/>
+              <a:lstStyle/>
+              <a:p>
+                <a:r>
+                  <a:rPr lang="en-US">
+                    <a:noFill/>
+                  </a:rPr>
+                  <a:t> </a:t>
+                </a:r>
+              </a:p>
+            </p:txBody>
+          </p:sp>
+        </mc:Fallback>
+      </mc:AlternateContent>
     </p:spTree>
     <p:extLst>
       <p:ext uri="{BB962C8B-B14F-4D97-AF65-F5344CB8AC3E}">
-        <p14:creationId xmlns:p14="http://schemas.microsoft.com/office/powerpoint/2010/main" val="2952946064"/>
+        <p14:creationId xmlns:p14="http://schemas.microsoft.com/office/powerpoint/2010/main" val="312047463"/>
       </p:ext>
     </p:extLst>
   </p:cSld>
@@ -10730,6 +11424,12 @@
 </file>
 
 <file path=customXml/item1.xml><?xml version="1.0" encoding="utf-8"?>
+<p:properties xmlns:p="http://schemas.microsoft.com/office/2006/metadata/properties" xmlns:xsi="http://www.w3.org/2001/XMLSchema-instance" xmlns:pc="http://schemas.microsoft.com/office/infopath/2007/PartnerControls">
+  <documentManagement/>
+</p:properties>
+</file>
+
+<file path=customXml/item2.xml><?xml version="1.0" encoding="utf-8"?>
 <ct:contentTypeSchema xmlns:ct="http://schemas.microsoft.com/office/2006/metadata/contentType" xmlns:ma="http://schemas.microsoft.com/office/2006/metadata/properties/metaAttributes" ct:_="" ma:_="" ma:contentTypeName="Document" ma:contentTypeID="0x0101007188BDCA587B344BBA6CB1A93FAE6998" ma:contentTypeVersion="2" ma:contentTypeDescription="Create a new document." ma:contentTypeScope="" ma:versionID="7a8e4b6720badb2566a0cfeddfaf2856">
   <xsd:schema xmlns:xsd="http://www.w3.org/2001/XMLSchema" xmlns:xs="http://www.w3.org/2001/XMLSchema" xmlns:p="http://schemas.microsoft.com/office/2006/metadata/properties" xmlns:ns2="ba111d12-426d-4af0-bcb6-460e36974645" targetNamespace="http://schemas.microsoft.com/office/2006/metadata/properties" ma:root="true" ma:fieldsID="989b05398519136c88ba0a8d54e3c3da" ns2:_="">
     <xsd:import namespace="ba111d12-426d-4af0-bcb6-460e36974645"/>
@@ -10861,12 +11561,6 @@
 </ct:contentTypeSchema>
 </file>
 
-<file path=customXml/item2.xml><?xml version="1.0" encoding="utf-8"?>
-<p:properties xmlns:p="http://schemas.microsoft.com/office/2006/metadata/properties" xmlns:xsi="http://www.w3.org/2001/XMLSchema-instance" xmlns:pc="http://schemas.microsoft.com/office/infopath/2007/PartnerControls">
-  <documentManagement/>
-</p:properties>
-</file>
-
 <file path=customXml/item3.xml><?xml version="1.0" encoding="utf-8"?>
 <?mso-contentType ?>
 <FormTemplates xmlns="http://schemas.microsoft.com/sharepoint/v3/contenttype/forms">
@@ -10877,6 +11571,15 @@
 </file>
 
 <file path=customXml/itemProps1.xml><?xml version="1.0" encoding="utf-8"?>
+<ds:datastoreItem xmlns:ds="http://schemas.openxmlformats.org/officeDocument/2006/customXml" ds:itemID="{7ACF14CA-9E7F-410C-99DF-E0FAFDE78C11}">
+  <ds:schemaRefs>
+    <ds:schemaRef ds:uri="http://schemas.microsoft.com/office/2006/metadata/properties"/>
+    <ds:schemaRef ds:uri="http://schemas.microsoft.com/office/infopath/2007/PartnerControls"/>
+  </ds:schemaRefs>
+</ds:datastoreItem>
+</file>
+
+<file path=customXml/itemProps2.xml><?xml version="1.0" encoding="utf-8"?>
 <ds:datastoreItem xmlns:ds="http://schemas.openxmlformats.org/officeDocument/2006/customXml" ds:itemID="{D622FF19-6ECD-4B79-A412-9430824D2BB6}">
   <ds:schemaRefs>
     <ds:schemaRef ds:uri="http://schemas.microsoft.com/office/2006/metadata/contentType"/>
@@ -10894,15 +11597,6 @@
 </ds:datastoreItem>
 </file>
 
-<file path=customXml/itemProps2.xml><?xml version="1.0" encoding="utf-8"?>
-<ds:datastoreItem xmlns:ds="http://schemas.openxmlformats.org/officeDocument/2006/customXml" ds:itemID="{7ACF14CA-9E7F-410C-99DF-E0FAFDE78C11}">
-  <ds:schemaRefs>
-    <ds:schemaRef ds:uri="http://schemas.microsoft.com/office/2006/metadata/properties"/>
-    <ds:schemaRef ds:uri="http://schemas.microsoft.com/office/infopath/2007/PartnerControls"/>
-  </ds:schemaRefs>
-</ds:datastoreItem>
-</file>
-
 <file path=customXml/itemProps3.xml><?xml version="1.0" encoding="utf-8"?>
 <ds:datastoreItem xmlns:ds="http://schemas.openxmlformats.org/officeDocument/2006/customXml" ds:itemID="{6C1A3F1B-CE3A-47AB-9F84-47E786467973}">
   <ds:schemaRefs>

</xml_diff>